<commit_message>
Adição de mais uma restrição!
</commit_message>
<xml_diff>
--- a/DOCUMENTAÇÃO/_SLIDE/JMBLogViewer.pptx
+++ b/DOCUMENTAÇÃO/_SLIDE/JMBLogViewer.pptx
@@ -4539,7 +4539,6 @@
               <a:rPr lang="pt-BR" dirty="0" smtClean="0"/>
               <a:t>Colocar url ou imagens do protótipo?</a:t>
             </a:r>
-            <a:endParaRPr lang="pt-BR" dirty="0" smtClean="0"/>
           </a:p>
         </p:txBody>
       </p:sp>
@@ -4843,7 +4842,6 @@
               <a:rPr lang="pt-BR" dirty="0" smtClean="0"/>
               <a:t>Obrigado a todos pela presença!</a:t>
             </a:r>
-            <a:endParaRPr lang="pt-BR" dirty="0" smtClean="0"/>
           </a:p>
         </p:txBody>
       </p:sp>
@@ -5290,7 +5288,6 @@
               <a:rPr lang="pt-BR" dirty="0" smtClean="0"/>
               <a:t>O Log4j</a:t>
             </a:r>
-            <a:endParaRPr lang="pt-BR" dirty="0" smtClean="0"/>
           </a:p>
           <a:p>
             <a:pPr>
@@ -5450,7 +5447,6 @@
               <a:rPr lang="pt-BR" dirty="0" smtClean="0"/>
               <a:t>Flexibilidade (configuração).</a:t>
             </a:r>
-            <a:endParaRPr lang="pt-BR" dirty="0" smtClean="0"/>
           </a:p>
         </p:txBody>
       </p:sp>
@@ -6890,16 +6886,17 @@
           <a:p>
             <a:r>
               <a:rPr lang="pt-BR" dirty="0" smtClean="0"/>
-              <a:t>Alguma mais? (Matheus e </a:t>
-            </a:r>
-            <a:r>
-              <a:rPr lang="pt-BR" dirty="0" err="1" smtClean="0"/>
-              <a:t>Junio</a:t>
+              <a:t>A duplicidade de campos </a:t>
+            </a:r>
+            <a:r>
+              <a:rPr lang="pt-BR" b="1" dirty="0" smtClean="0"/>
+              <a:t>não</a:t>
             </a:r>
             <a:r>
               <a:rPr lang="pt-BR" dirty="0" smtClean="0"/>
-              <a:t>)</a:t>
-            </a:r>
+              <a:t> serão tratados na interface.</a:t>
+            </a:r>
+            <a:endParaRPr lang="pt-BR" dirty="0" smtClean="0"/>
           </a:p>
           <a:p>
             <a:endParaRPr lang="pt-BR" dirty="0" smtClean="0"/>

</xml_diff>

<commit_message>
Reorganização dos slides e retirada de alguns slides!
</commit_message>
<xml_diff>
--- a/DOCUMENTAÇÃO/_SLIDE/JMBLogViewer.pptx
+++ b/DOCUMENTAÇÃO/_SLIDE/JMBLogViewer.pptx
@@ -5,25 +5,22 @@
     <p:sldMasterId id="2147483660" r:id="rId1"/>
   </p:sldMasterIdLst>
   <p:notesMasterIdLst>
-    <p:notesMasterId r:id="rId18"/>
+    <p:notesMasterId r:id="rId15"/>
   </p:notesMasterIdLst>
   <p:sldIdLst>
     <p:sldId id="256" r:id="rId2"/>
     <p:sldId id="257" r:id="rId3"/>
     <p:sldId id="267" r:id="rId4"/>
-    <p:sldId id="277" r:id="rId5"/>
+    <p:sldId id="269" r:id="rId5"/>
     <p:sldId id="268" r:id="rId6"/>
-    <p:sldId id="269" r:id="rId7"/>
-    <p:sldId id="270" r:id="rId8"/>
-    <p:sldId id="278" r:id="rId9"/>
-    <p:sldId id="271" r:id="rId10"/>
-    <p:sldId id="272" r:id="rId11"/>
-    <p:sldId id="273" r:id="rId12"/>
-    <p:sldId id="274" r:id="rId13"/>
-    <p:sldId id="276" r:id="rId14"/>
-    <p:sldId id="275" r:id="rId15"/>
-    <p:sldId id="280" r:id="rId16"/>
-    <p:sldId id="279" r:id="rId17"/>
+    <p:sldId id="270" r:id="rId7"/>
+    <p:sldId id="278" r:id="rId8"/>
+    <p:sldId id="271" r:id="rId9"/>
+    <p:sldId id="274" r:id="rId10"/>
+    <p:sldId id="276" r:id="rId11"/>
+    <p:sldId id="275" r:id="rId12"/>
+    <p:sldId id="280" r:id="rId13"/>
+    <p:sldId id="279" r:id="rId14"/>
   </p:sldIdLst>
   <p:sldSz cx="9144000" cy="6858000" type="screen4x3"/>
   <p:notesSz cx="6858000" cy="9144000"/>
@@ -4368,7 +4365,7 @@
       </p:grpSpPr>
       <p:sp>
         <p:nvSpPr>
-          <p:cNvPr id="11266" name="Título 1"/>
+          <p:cNvPr id="14338" name="Título 1"/>
           <p:cNvSpPr>
             <a:spLocks noGrp="1"/>
           </p:cNvSpPr>
@@ -4382,15 +4379,15 @@
           <a:lstStyle/>
           <a:p>
             <a:r>
-              <a:rPr lang="pt-BR" smtClean="0"/>
-              <a:t>Melhorias Futuras</a:t>
-            </a:r>
-          </a:p>
-        </p:txBody>
-      </p:sp>
-      <p:sp>
-        <p:nvSpPr>
-          <p:cNvPr id="11267" name="Espaço Reservado para Conteúdo 2"/>
+              <a:rPr lang="pt-BR" dirty="0" smtClean="0"/>
+              <a:t>Conclusão</a:t>
+            </a:r>
+          </a:p>
+        </p:txBody>
+      </p:sp>
+      <p:sp>
+        <p:nvSpPr>
+          <p:cNvPr id="14339" name="Espaço Reservado para Conteúdo 2"/>
           <p:cNvSpPr>
             <a:spLocks noGrp="1"/>
           </p:cNvSpPr>
@@ -4403,7 +4400,41 @@
           <a:bodyPr/>
           <a:lstStyle/>
           <a:p>
-            <a:endParaRPr lang="pt-BR" smtClean="0"/>
+            <a:r>
+              <a:rPr lang="pt-BR" dirty="0" smtClean="0"/>
+              <a:t>Dificuldades;</a:t>
+            </a:r>
+          </a:p>
+          <a:p>
+            <a:endParaRPr lang="pt-BR" dirty="0" smtClean="0"/>
+          </a:p>
+          <a:p>
+            <a:r>
+              <a:rPr lang="pt-BR" dirty="0" smtClean="0"/>
+              <a:t>Aprendizado</a:t>
+            </a:r>
+            <a:r>
+              <a:rPr lang="pt-BR" dirty="0" smtClean="0"/>
+              <a:t>; e</a:t>
+            </a:r>
+            <a:endParaRPr lang="pt-BR" dirty="0" smtClean="0"/>
+          </a:p>
+          <a:p>
+            <a:endParaRPr lang="pt-BR" dirty="0" smtClean="0"/>
+          </a:p>
+          <a:p>
+            <a:r>
+              <a:rPr lang="pt-BR" dirty="0" smtClean="0"/>
+              <a:t>Melhorias </a:t>
+            </a:r>
+            <a:r>
+              <a:rPr lang="pt-BR" dirty="0" smtClean="0"/>
+              <a:t>Futuras;</a:t>
+            </a:r>
+            <a:endParaRPr lang="pt-BR" dirty="0" smtClean="0"/>
+          </a:p>
+          <a:p>
+            <a:endParaRPr lang="pt-BR" dirty="0" smtClean="0"/>
           </a:p>
         </p:txBody>
       </p:sp>
@@ -4412,6 +4443,13 @@
   <p:clrMapOvr>
     <a:masterClrMapping/>
   </p:clrMapOvr>
+  <p:timing>
+    <p:tnLst>
+      <p:par>
+        <p:cTn id="1" dur="indefinite" restart="never" nodeType="tmRoot"/>
+      </p:par>
+    </p:tnLst>
+  </p:timing>
 </p:sld>
 </file>
 
@@ -4434,7 +4472,7 @@
       </p:grpSpPr>
       <p:sp>
         <p:nvSpPr>
-          <p:cNvPr id="12290" name="Título 1"/>
+          <p:cNvPr id="15362" name="Título 1"/>
           <p:cNvSpPr>
             <a:spLocks noGrp="1"/>
           </p:cNvSpPr>
@@ -4449,14 +4487,14 @@
           <a:p>
             <a:r>
               <a:rPr lang="pt-BR" smtClean="0"/>
-              <a:t>Aprendizado</a:t>
-            </a:r>
-          </a:p>
-        </p:txBody>
-      </p:sp>
-      <p:sp>
-        <p:nvSpPr>
-          <p:cNvPr id="12291" name="Espaço Reservado para Conteúdo 2"/>
+              <a:t>Agradecimentos</a:t>
+            </a:r>
+          </a:p>
+        </p:txBody>
+      </p:sp>
+      <p:sp>
+        <p:nvSpPr>
+          <p:cNvPr id="15363" name="Espaço Reservado para Conteúdo 2"/>
           <p:cNvSpPr>
             <a:spLocks noGrp="1"/>
           </p:cNvSpPr>
@@ -4478,6 +4516,13 @@
   <p:clrMapOvr>
     <a:masterClrMapping/>
   </p:clrMapOvr>
+  <p:timing>
+    <p:tnLst>
+      <p:par>
+        <p:cTn id="1" dur="indefinite" restart="never" nodeType="tmRoot"/>
+      </p:par>
+    </p:tnLst>
+  </p:timing>
 </p:sld>
 </file>
 
@@ -4500,7 +4545,7 @@
       </p:grpSpPr>
       <p:sp>
         <p:nvSpPr>
-          <p:cNvPr id="13314" name="Título 1"/>
+          <p:cNvPr id="16386" name="Título 1"/>
           <p:cNvSpPr>
             <a:spLocks noGrp="1"/>
           </p:cNvSpPr>
@@ -4515,14 +4560,14 @@
           <a:p>
             <a:r>
               <a:rPr lang="pt-BR" smtClean="0"/>
-              <a:t>Protótipo</a:t>
-            </a:r>
-          </a:p>
-        </p:txBody>
-      </p:sp>
-      <p:sp>
-        <p:nvSpPr>
-          <p:cNvPr id="13315" name="Espaço Reservado para Conteúdo 2"/>
+              <a:t>Perguntas</a:t>
+            </a:r>
+          </a:p>
+        </p:txBody>
+      </p:sp>
+      <p:sp>
+        <p:nvSpPr>
+          <p:cNvPr id="16387" name="Espaço Reservado para Conteúdo 2"/>
           <p:cNvSpPr>
             <a:spLocks noGrp="1"/>
           </p:cNvSpPr>
@@ -4535,10 +4580,7 @@
           <a:bodyPr/>
           <a:lstStyle/>
           <a:p>
-            <a:r>
-              <a:rPr lang="pt-BR" dirty="0" smtClean="0"/>
-              <a:t>Colocar url ou imagens do protótipo?</a:t>
-            </a:r>
+            <a:endParaRPr lang="pt-BR" smtClean="0"/>
           </a:p>
         </p:txBody>
       </p:sp>
@@ -4547,6 +4589,13 @@
   <p:clrMapOvr>
     <a:masterClrMapping/>
   </p:clrMapOvr>
+  <p:timing>
+    <p:tnLst>
+      <p:par>
+        <p:cTn id="1" dur="indefinite" restart="never" nodeType="tmRoot"/>
+      </p:par>
+    </p:tnLst>
+  </p:timing>
 </p:sld>
 </file>
 
@@ -4569,7 +4618,7 @@
       </p:grpSpPr>
       <p:sp>
         <p:nvSpPr>
-          <p:cNvPr id="14338" name="Título 1"/>
+          <p:cNvPr id="17410" name="Título 1"/>
           <p:cNvSpPr>
             <a:spLocks noGrp="1"/>
           </p:cNvSpPr>
@@ -4584,14 +4633,14 @@
           <a:p>
             <a:r>
               <a:rPr lang="pt-BR" smtClean="0"/>
-              <a:t>Conclusão</a:t>
-            </a:r>
-          </a:p>
-        </p:txBody>
-      </p:sp>
-      <p:sp>
-        <p:nvSpPr>
-          <p:cNvPr id="14339" name="Espaço Reservado para Conteúdo 2"/>
+              <a:t>Fim</a:t>
+            </a:r>
+          </a:p>
+        </p:txBody>
+      </p:sp>
+      <p:sp>
+        <p:nvSpPr>
+          <p:cNvPr id="17411" name="Espaço Reservado para Conteúdo 2"/>
           <p:cNvSpPr>
             <a:spLocks noGrp="1"/>
           </p:cNvSpPr>
@@ -4604,34 +4653,19 @@
           <a:bodyPr/>
           <a:lstStyle/>
           <a:p>
+            <a:endParaRPr lang="pt-BR" dirty="0" smtClean="0"/>
+          </a:p>
+          <a:p>
+            <a:endParaRPr lang="pt-BR" dirty="0" smtClean="0"/>
+          </a:p>
+          <a:p>
+            <a:endParaRPr lang="pt-BR" dirty="0" smtClean="0"/>
+          </a:p>
+          <a:p>
             <a:r>
               <a:rPr lang="pt-BR" dirty="0" smtClean="0"/>
-              <a:t>Dificuldades;</a:t>
-            </a:r>
-          </a:p>
-          <a:p>
-            <a:endParaRPr lang="pt-BR" dirty="0" smtClean="0"/>
-          </a:p>
-          <a:p>
-            <a:r>
-              <a:rPr lang="pt-BR" dirty="0" smtClean="0"/>
-              <a:t>Aprendizado;</a:t>
-            </a:r>
-          </a:p>
-          <a:p>
-            <a:endParaRPr lang="pt-BR" dirty="0" smtClean="0"/>
-          </a:p>
-          <a:p>
-            <a:r>
-              <a:rPr lang="pt-BR" dirty="0" smtClean="0"/>
-              <a:t>Melhorias Futuras (Limitações pode ser encaixado neste slide?)</a:t>
-            </a:r>
-          </a:p>
-          <a:p>
-            <a:endParaRPr lang="pt-BR" dirty="0" smtClean="0"/>
-          </a:p>
-          <a:p>
-            <a:endParaRPr lang="pt-BR" dirty="0" smtClean="0"/>
+              <a:t>Obrigado a todos pela presença!</a:t>
+            </a:r>
           </a:p>
         </p:txBody>
       </p:sp>
@@ -4640,216 +4674,13 @@
   <p:clrMapOvr>
     <a:masterClrMapping/>
   </p:clrMapOvr>
-</p:sld>
-</file>
-
-<file path=ppt/slides/slide14.xml><?xml version="1.0" encoding="utf-8"?>
-<p:sld xmlns:a="http://schemas.openxmlformats.org/drawingml/2006/main" xmlns:r="http://schemas.openxmlformats.org/officeDocument/2006/relationships" xmlns:p="http://schemas.openxmlformats.org/presentationml/2006/main">
-  <p:cSld>
-    <p:spTree>
-      <p:nvGrpSpPr>
-        <p:cNvPr id="1" name=""/>
-        <p:cNvGrpSpPr/>
-        <p:nvPr/>
-      </p:nvGrpSpPr>
-      <p:grpSpPr>
-        <a:xfrm>
-          <a:off x="0" y="0"/>
-          <a:ext cx="0" cy="0"/>
-          <a:chOff x="0" y="0"/>
-          <a:chExt cx="0" cy="0"/>
-        </a:xfrm>
-      </p:grpSpPr>
-      <p:sp>
-        <p:nvSpPr>
-          <p:cNvPr id="15362" name="Título 1"/>
-          <p:cNvSpPr>
-            <a:spLocks noGrp="1"/>
-          </p:cNvSpPr>
-          <p:nvPr>
-            <p:ph type="title"/>
-          </p:nvPr>
-        </p:nvSpPr>
-        <p:spPr/>
-        <p:txBody>
-          <a:bodyPr/>
-          <a:lstStyle/>
-          <a:p>
-            <a:r>
-              <a:rPr lang="pt-BR" smtClean="0"/>
-              <a:t>Agradecimentos</a:t>
-            </a:r>
-          </a:p>
-        </p:txBody>
-      </p:sp>
-      <p:sp>
-        <p:nvSpPr>
-          <p:cNvPr id="15363" name="Espaço Reservado para Conteúdo 2"/>
-          <p:cNvSpPr>
-            <a:spLocks noGrp="1"/>
-          </p:cNvSpPr>
-          <p:nvPr>
-            <p:ph idx="1"/>
-          </p:nvPr>
-        </p:nvSpPr>
-        <p:spPr/>
-        <p:txBody>
-          <a:bodyPr/>
-          <a:lstStyle/>
-          <a:p>
-            <a:endParaRPr lang="pt-BR" smtClean="0"/>
-          </a:p>
-        </p:txBody>
-      </p:sp>
-    </p:spTree>
-  </p:cSld>
-  <p:clrMapOvr>
-    <a:masterClrMapping/>
-  </p:clrMapOvr>
-</p:sld>
-</file>
-
-<file path=ppt/slides/slide15.xml><?xml version="1.0" encoding="utf-8"?>
-<p:sld xmlns:a="http://schemas.openxmlformats.org/drawingml/2006/main" xmlns:r="http://schemas.openxmlformats.org/officeDocument/2006/relationships" xmlns:p="http://schemas.openxmlformats.org/presentationml/2006/main">
-  <p:cSld>
-    <p:spTree>
-      <p:nvGrpSpPr>
-        <p:cNvPr id="1" name=""/>
-        <p:cNvGrpSpPr/>
-        <p:nvPr/>
-      </p:nvGrpSpPr>
-      <p:grpSpPr>
-        <a:xfrm>
-          <a:off x="0" y="0"/>
-          <a:ext cx="0" cy="0"/>
-          <a:chOff x="0" y="0"/>
-          <a:chExt cx="0" cy="0"/>
-        </a:xfrm>
-      </p:grpSpPr>
-      <p:sp>
-        <p:nvSpPr>
-          <p:cNvPr id="16386" name="Título 1"/>
-          <p:cNvSpPr>
-            <a:spLocks noGrp="1"/>
-          </p:cNvSpPr>
-          <p:nvPr>
-            <p:ph type="title"/>
-          </p:nvPr>
-        </p:nvSpPr>
-        <p:spPr/>
-        <p:txBody>
-          <a:bodyPr/>
-          <a:lstStyle/>
-          <a:p>
-            <a:r>
-              <a:rPr lang="pt-BR" smtClean="0"/>
-              <a:t>Perguntas</a:t>
-            </a:r>
-          </a:p>
-        </p:txBody>
-      </p:sp>
-      <p:sp>
-        <p:nvSpPr>
-          <p:cNvPr id="16387" name="Espaço Reservado para Conteúdo 2"/>
-          <p:cNvSpPr>
-            <a:spLocks noGrp="1"/>
-          </p:cNvSpPr>
-          <p:nvPr>
-            <p:ph idx="1"/>
-          </p:nvPr>
-        </p:nvSpPr>
-        <p:spPr/>
-        <p:txBody>
-          <a:bodyPr/>
-          <a:lstStyle/>
-          <a:p>
-            <a:endParaRPr lang="pt-BR" smtClean="0"/>
-          </a:p>
-        </p:txBody>
-      </p:sp>
-    </p:spTree>
-  </p:cSld>
-  <p:clrMapOvr>
-    <a:masterClrMapping/>
-  </p:clrMapOvr>
-</p:sld>
-</file>
-
-<file path=ppt/slides/slide16.xml><?xml version="1.0" encoding="utf-8"?>
-<p:sld xmlns:a="http://schemas.openxmlformats.org/drawingml/2006/main" xmlns:r="http://schemas.openxmlformats.org/officeDocument/2006/relationships" xmlns:p="http://schemas.openxmlformats.org/presentationml/2006/main">
-  <p:cSld>
-    <p:spTree>
-      <p:nvGrpSpPr>
-        <p:cNvPr id="1" name=""/>
-        <p:cNvGrpSpPr/>
-        <p:nvPr/>
-      </p:nvGrpSpPr>
-      <p:grpSpPr>
-        <a:xfrm>
-          <a:off x="0" y="0"/>
-          <a:ext cx="0" cy="0"/>
-          <a:chOff x="0" y="0"/>
-          <a:chExt cx="0" cy="0"/>
-        </a:xfrm>
-      </p:grpSpPr>
-      <p:sp>
-        <p:nvSpPr>
-          <p:cNvPr id="17410" name="Título 1"/>
-          <p:cNvSpPr>
-            <a:spLocks noGrp="1"/>
-          </p:cNvSpPr>
-          <p:nvPr>
-            <p:ph type="title"/>
-          </p:nvPr>
-        </p:nvSpPr>
-        <p:spPr/>
-        <p:txBody>
-          <a:bodyPr/>
-          <a:lstStyle/>
-          <a:p>
-            <a:r>
-              <a:rPr lang="pt-BR" smtClean="0"/>
-              <a:t>Fim</a:t>
-            </a:r>
-          </a:p>
-        </p:txBody>
-      </p:sp>
-      <p:sp>
-        <p:nvSpPr>
-          <p:cNvPr id="17411" name="Espaço Reservado para Conteúdo 2"/>
-          <p:cNvSpPr>
-            <a:spLocks noGrp="1"/>
-          </p:cNvSpPr>
-          <p:nvPr>
-            <p:ph idx="1"/>
-          </p:nvPr>
-        </p:nvSpPr>
-        <p:spPr/>
-        <p:txBody>
-          <a:bodyPr/>
-          <a:lstStyle/>
-          <a:p>
-            <a:endParaRPr lang="pt-BR" dirty="0" smtClean="0"/>
-          </a:p>
-          <a:p>
-            <a:endParaRPr lang="pt-BR" dirty="0" smtClean="0"/>
-          </a:p>
-          <a:p>
-            <a:endParaRPr lang="pt-BR" dirty="0" smtClean="0"/>
-          </a:p>
-          <a:p>
-            <a:r>
-              <a:rPr lang="pt-BR" dirty="0" smtClean="0"/>
-              <a:t>Obrigado a todos pela presença!</a:t>
-            </a:r>
-          </a:p>
-        </p:txBody>
-      </p:sp>
-    </p:spTree>
-  </p:cSld>
-  <p:clrMapOvr>
-    <a:masterClrMapping/>
-  </p:clrMapOvr>
+  <p:timing>
+    <p:tnLst>
+      <p:par>
+        <p:cTn id="1" dur="indefinite" restart="never" nodeType="tmRoot"/>
+      </p:par>
+    </p:tnLst>
+  </p:timing>
 </p:sld>
 </file>
 
@@ -4922,8 +4753,57 @@
                 <a:latin typeface="Times New Roman" pitchFamily="18" charset="0"/>
                 <a:cs typeface="Times New Roman" pitchFamily="18" charset="0"/>
               </a:rPr>
-              <a:t>Conceitos</a:t>
-            </a:r>
+              <a:t>C</a:t>
+            </a:r>
+            <a:r>
+              <a:rPr lang="pt-BR" dirty="0" smtClean="0">
+                <a:solidFill>
+                  <a:schemeClr val="tx1"/>
+                </a:solidFill>
+                <a:latin typeface="Times New Roman" pitchFamily="18" charset="0"/>
+                <a:cs typeface="Times New Roman" pitchFamily="18" charset="0"/>
+              </a:rPr>
+              <a:t>onceito</a:t>
+            </a:r>
+            <a:r>
+              <a:rPr lang="pt-BR" dirty="0" smtClean="0">
+                <a:solidFill>
+                  <a:schemeClr val="tx1"/>
+                </a:solidFill>
+                <a:latin typeface="Times New Roman" pitchFamily="18" charset="0"/>
+                <a:cs typeface="Times New Roman" pitchFamily="18" charset="0"/>
+              </a:rPr>
+              <a:t>s</a:t>
+            </a:r>
+          </a:p>
+          <a:p>
+            <a:r>
+              <a:rPr lang="pt-BR" dirty="0" smtClean="0">
+                <a:solidFill>
+                  <a:schemeClr val="tx1"/>
+                </a:solidFill>
+                <a:latin typeface="Times New Roman" pitchFamily="18" charset="0"/>
+                <a:cs typeface="Times New Roman" pitchFamily="18" charset="0"/>
+              </a:rPr>
+              <a:t>Cenário atual</a:t>
+            </a:r>
+            <a:r>
+              <a:rPr lang="pt-BR" dirty="0" smtClean="0">
+                <a:solidFill>
+                  <a:schemeClr val="tx1"/>
+                </a:solidFill>
+                <a:latin typeface="Times New Roman" pitchFamily="18" charset="0"/>
+                <a:cs typeface="Times New Roman" pitchFamily="18" charset="0"/>
+              </a:rPr>
+              <a:t>;</a:t>
+            </a:r>
+            <a:endParaRPr lang="pt-BR" dirty="0" smtClean="0">
+              <a:solidFill>
+                <a:schemeClr val="tx1"/>
+              </a:solidFill>
+              <a:latin typeface="Times New Roman" pitchFamily="18" charset="0"/>
+              <a:cs typeface="Times New Roman" pitchFamily="18" charset="0"/>
+            </a:endParaRPr>
           </a:p>
           <a:p>
             <a:pPr eaLnBrk="1" hangingPunct="1"/>
@@ -4948,8 +4828,19 @@
                 <a:latin typeface="Times New Roman" pitchFamily="18" charset="0"/>
                 <a:cs typeface="Times New Roman" pitchFamily="18" charset="0"/>
               </a:rPr>
-              <a:t>Cenário atual;</a:t>
-            </a:r>
+              <a:t>Arquitetura</a:t>
+            </a:r>
+            <a:r>
+              <a:rPr lang="pt-BR" dirty="0" smtClean="0">
+                <a:latin typeface="Times New Roman" pitchFamily="18" charset="0"/>
+                <a:cs typeface="Times New Roman" pitchFamily="18" charset="0"/>
+              </a:rPr>
+              <a:t>;</a:t>
+            </a:r>
+            <a:endParaRPr lang="pt-BR" dirty="0" smtClean="0">
+              <a:latin typeface="Times New Roman" pitchFamily="18" charset="0"/>
+              <a:cs typeface="Times New Roman" pitchFamily="18" charset="0"/>
+            </a:endParaRPr>
           </a:p>
           <a:p>
             <a:pPr eaLnBrk="1" hangingPunct="1"/>
@@ -4961,45 +4852,85 @@
                 <a:latin typeface="Times New Roman" pitchFamily="18" charset="0"/>
                 <a:cs typeface="Times New Roman" pitchFamily="18" charset="0"/>
               </a:rPr>
-              <a:t>Arquitetura da </a:t>
+              <a:t>Protótipo</a:t>
             </a:r>
             <a:r>
               <a:rPr lang="pt-BR" dirty="0" smtClean="0">
                 <a:latin typeface="Times New Roman" pitchFamily="18" charset="0"/>
                 <a:cs typeface="Times New Roman" pitchFamily="18" charset="0"/>
               </a:rPr>
-              <a:t>Solução;</a:t>
-            </a:r>
-          </a:p>
-          <a:p>
-            <a:pPr eaLnBrk="1" hangingPunct="1"/>
+              <a:t>;</a:t>
+            </a:r>
+          </a:p>
+          <a:p>
+            <a:pPr lvl="0">
+              <a:defRPr/>
+            </a:pPr>
             <a:r>
               <a:rPr lang="pt-BR" dirty="0" smtClean="0">
+                <a:solidFill>
+                  <a:schemeClr val="tx1"/>
+                </a:solidFill>
                 <a:latin typeface="Times New Roman" pitchFamily="18" charset="0"/>
                 <a:cs typeface="Times New Roman" pitchFamily="18" charset="0"/>
               </a:rPr>
-              <a:t>Limitações</a:t>
-            </a:r>
-          </a:p>
-          <a:p>
-            <a:pPr eaLnBrk="1" hangingPunct="1"/>
+              <a:t>Conclusão</a:t>
+            </a:r>
+          </a:p>
+          <a:p>
+            <a:pPr>
+              <a:defRPr/>
+            </a:pPr>
             <a:r>
               <a:rPr lang="pt-BR" dirty="0" smtClean="0">
+                <a:solidFill>
+                  <a:schemeClr val="tx1"/>
+                </a:solidFill>
                 <a:latin typeface="Times New Roman" pitchFamily="18" charset="0"/>
                 <a:cs typeface="Times New Roman" pitchFamily="18" charset="0"/>
               </a:rPr>
-              <a:t>Melhorias futuras</a:t>
-            </a:r>
-          </a:p>
-          <a:p>
-            <a:pPr eaLnBrk="1" hangingPunct="1"/>
+              <a:t>Perguntas; e</a:t>
+            </a:r>
+          </a:p>
+          <a:p>
+            <a:pPr>
+              <a:defRPr/>
+            </a:pPr>
             <a:r>
               <a:rPr lang="pt-BR" dirty="0" smtClean="0">
+                <a:solidFill>
+                  <a:schemeClr val="tx1"/>
+                </a:solidFill>
                 <a:latin typeface="Times New Roman" pitchFamily="18" charset="0"/>
                 <a:cs typeface="Times New Roman" pitchFamily="18" charset="0"/>
               </a:rPr>
-              <a:t>Protótipo</a:t>
-            </a:r>
+              <a:t>Agradecimentos</a:t>
+            </a:r>
+            <a:endParaRPr lang="pt-BR" dirty="0" smtClean="0">
+              <a:solidFill>
+                <a:schemeClr val="tx1"/>
+              </a:solidFill>
+              <a:latin typeface="Times New Roman" pitchFamily="18" charset="0"/>
+              <a:cs typeface="Times New Roman" pitchFamily="18" charset="0"/>
+            </a:endParaRPr>
+          </a:p>
+          <a:p>
+            <a:pPr lvl="0">
+              <a:defRPr/>
+            </a:pPr>
+            <a:endParaRPr lang="pt-BR" dirty="0" smtClean="0">
+              <a:latin typeface="Times New Roman" pitchFamily="18" charset="0"/>
+              <a:cs typeface="Times New Roman" pitchFamily="18" charset="0"/>
+            </a:endParaRPr>
+          </a:p>
+          <a:p>
+            <a:pPr eaLnBrk="1" hangingPunct="1">
+              <a:buNone/>
+            </a:pPr>
+            <a:endParaRPr lang="pt-BR" dirty="0" smtClean="0">
+              <a:latin typeface="Times New Roman" pitchFamily="18" charset="0"/>
+              <a:cs typeface="Times New Roman" pitchFamily="18" charset="0"/>
+            </a:endParaRPr>
           </a:p>
         </p:txBody>
       </p:sp>
@@ -5040,138 +4971,15 @@
                 <a:schemeClr val="accent1"/>
               </a:buClr>
               <a:buSzPct val="70000"/>
-              <a:buFont typeface="Wingdings 2"/>
-              <a:buChar char=""/>
               <a:tabLst/>
               <a:defRPr/>
             </a:pPr>
-            <a:r>
-              <a:rPr kumimoji="0" lang="pt-BR" sz="3200" b="0" i="0" u="none" strike="noStrike" kern="1200" cap="none" spc="0" normalizeH="0" baseline="0" noProof="0" dirty="0" smtClean="0">
-                <a:ln>
-                  <a:noFill/>
-                </a:ln>
-                <a:solidFill>
-                  <a:schemeClr val="tx1"/>
-                </a:solidFill>
-                <a:effectLst/>
-                <a:uLnTx/>
-                <a:uFillTx/>
-                <a:latin typeface="Times New Roman" pitchFamily="18" charset="0"/>
-                <a:ea typeface="+mn-ea"/>
-                <a:cs typeface="Times New Roman" pitchFamily="18" charset="0"/>
-              </a:rPr>
-              <a:t>Aprendizado</a:t>
-            </a:r>
-          </a:p>
-          <a:p>
-            <a:pPr marL="342900" marR="0" lvl="0" indent="-342900" algn="l" defTabSz="914400" rtl="0" eaLnBrk="1" fontAlgn="auto" latinLnBrk="0" hangingPunct="1">
-              <a:lnSpc>
-                <a:spcPct val="100000"/>
-              </a:lnSpc>
-              <a:spcBef>
-                <a:spcPct val="20000"/>
-              </a:spcBef>
-              <a:spcAft>
-                <a:spcPts val="0"/>
-              </a:spcAft>
-              <a:buClr>
-                <a:schemeClr val="accent1"/>
-              </a:buClr>
-              <a:buSzPct val="70000"/>
-              <a:buFont typeface="Wingdings 2"/>
-              <a:buChar char=""/>
-              <a:tabLst/>
-              <a:defRPr/>
-            </a:pPr>
-            <a:r>
-              <a:rPr kumimoji="0" lang="pt-BR" sz="3200" b="0" i="0" u="none" strike="noStrike" kern="1200" cap="none" spc="0" normalizeH="0" baseline="0" noProof="0" dirty="0" smtClean="0">
-                <a:ln>
-                  <a:noFill/>
-                </a:ln>
-                <a:solidFill>
-                  <a:schemeClr val="tx1"/>
-                </a:solidFill>
-                <a:effectLst/>
-                <a:uLnTx/>
-                <a:uFillTx/>
-                <a:latin typeface="Times New Roman" pitchFamily="18" charset="0"/>
-                <a:ea typeface="+mn-ea"/>
-                <a:cs typeface="Times New Roman" pitchFamily="18" charset="0"/>
-              </a:rPr>
-              <a:t>Conclusão</a:t>
-            </a:r>
-          </a:p>
-          <a:p>
-            <a:pPr marL="342900" marR="0" lvl="0" indent="-342900" algn="l" defTabSz="914400" rtl="0" eaLnBrk="1" fontAlgn="auto" latinLnBrk="0" hangingPunct="1">
-              <a:lnSpc>
-                <a:spcPct val="100000"/>
-              </a:lnSpc>
-              <a:spcBef>
-                <a:spcPct val="20000"/>
-              </a:spcBef>
-              <a:spcAft>
-                <a:spcPts val="0"/>
-              </a:spcAft>
-              <a:buClr>
-                <a:schemeClr val="accent1"/>
-              </a:buClr>
-              <a:buSzPct val="70000"/>
-              <a:buFont typeface="Wingdings 2"/>
-              <a:buChar char=""/>
-              <a:tabLst/>
-              <a:defRPr/>
-            </a:pPr>
-            <a:r>
-              <a:rPr kumimoji="0" lang="pt-BR" sz="3200" b="0" i="0" u="none" strike="noStrike" kern="1200" cap="none" spc="0" normalizeH="0" baseline="0" noProof="0" dirty="0" smtClean="0">
-                <a:ln>
-                  <a:noFill/>
-                </a:ln>
-                <a:solidFill>
-                  <a:schemeClr val="tx1"/>
-                </a:solidFill>
-                <a:effectLst/>
-                <a:uLnTx/>
-                <a:uFillTx/>
-                <a:latin typeface="Times New Roman" pitchFamily="18" charset="0"/>
-                <a:ea typeface="+mn-ea"/>
-                <a:cs typeface="Times New Roman" pitchFamily="18" charset="0"/>
-              </a:rPr>
-              <a:t>Agradecimentos</a:t>
-            </a:r>
-          </a:p>
-          <a:p>
-            <a:pPr marL="342900" marR="0" lvl="0" indent="-342900" algn="l" defTabSz="914400" rtl="0" eaLnBrk="1" fontAlgn="auto" latinLnBrk="0" hangingPunct="1">
-              <a:lnSpc>
-                <a:spcPct val="100000"/>
-              </a:lnSpc>
-              <a:spcBef>
-                <a:spcPct val="20000"/>
-              </a:spcBef>
-              <a:spcAft>
-                <a:spcPts val="0"/>
-              </a:spcAft>
-              <a:buClr>
-                <a:schemeClr val="accent1"/>
-              </a:buClr>
-              <a:buSzPct val="70000"/>
-              <a:buFont typeface="Wingdings 2"/>
-              <a:buChar char=""/>
-              <a:tabLst/>
-              <a:defRPr/>
-            </a:pPr>
-            <a:r>
-              <a:rPr lang="pt-BR" sz="3200" dirty="0" smtClean="0">
-                <a:latin typeface="Times New Roman" pitchFamily="18" charset="0"/>
-                <a:cs typeface="Times New Roman" pitchFamily="18" charset="0"/>
-              </a:rPr>
-              <a:t>Perguntas</a:t>
-            </a:r>
             <a:endParaRPr kumimoji="0" lang="pt-BR" sz="3200" b="0" i="0" u="none" strike="noStrike" kern="1200" cap="none" spc="0" normalizeH="0" baseline="0" noProof="0" dirty="0" smtClean="0">
               <a:ln>
                 <a:noFill/>
               </a:ln>
               <a:solidFill>
-                <a:schemeClr val="tx2"/>
+                <a:schemeClr val="tx1"/>
               </a:solidFill>
               <a:effectLst/>
               <a:uLnTx/>
@@ -5302,6 +5110,13 @@
   <p:clrMapOvr>
     <a:masterClrMapping/>
   </p:clrMapOvr>
+  <p:timing>
+    <p:tnLst>
+      <p:par>
+        <p:cTn id="1" dur="indefinite" restart="never" nodeType="tmRoot"/>
+      </p:par>
+    </p:tnLst>
+  </p:timing>
 </p:sld>
 </file>
 
@@ -5324,7 +5139,7 @@
       </p:grpSpPr>
       <p:sp>
         <p:nvSpPr>
-          <p:cNvPr id="5122" name="Título 1"/>
+          <p:cNvPr id="7170" name="Título 1"/>
           <p:cNvSpPr>
             <a:spLocks noGrp="1"/>
           </p:cNvSpPr>
@@ -5339,14 +5154,14 @@
           <a:p>
             <a:r>
               <a:rPr lang="pt-BR" smtClean="0"/>
-              <a:t>Conceitos</a:t>
-            </a:r>
-          </a:p>
-        </p:txBody>
-      </p:sp>
-      <p:sp>
-        <p:nvSpPr>
-          <p:cNvPr id="5123" name="Espaço Reservado para Conteúdo 2"/>
+              <a:t>Cenário Atual</a:t>
+            </a:r>
+          </a:p>
+        </p:txBody>
+      </p:sp>
+      <p:sp>
+        <p:nvSpPr>
+          <p:cNvPr id="7171" name="Espaço Reservado para Conteúdo 2"/>
           <p:cNvSpPr>
             <a:spLocks noGrp="1"/>
           </p:cNvSpPr>
@@ -5356,10 +5171,86 @@
         </p:nvSpPr>
         <p:spPr/>
         <p:txBody>
-          <a:bodyPr/>
-          <a:lstStyle/>
-          <a:p>
-            <a:endParaRPr lang="pt-BR" smtClean="0"/>
+          <a:bodyPr>
+            <a:normAutofit/>
+          </a:bodyPr>
+          <a:lstStyle/>
+          <a:p>
+            <a:pPr>
+              <a:lnSpc>
+                <a:spcPct val="110000"/>
+              </a:lnSpc>
+            </a:pPr>
+            <a:r>
+              <a:rPr lang="pt-BR" dirty="0" smtClean="0"/>
+              <a:t>Utilização de </a:t>
+            </a:r>
+            <a:r>
+              <a:rPr lang="pt-BR" i="1" dirty="0" err="1" smtClean="0"/>
+              <a:t>logs</a:t>
+            </a:r>
+            <a:r>
+              <a:rPr lang="pt-BR" dirty="0" smtClean="0"/>
+              <a:t> para o monitoramento de sistemas;</a:t>
+            </a:r>
+          </a:p>
+          <a:p>
+            <a:pPr>
+              <a:lnSpc>
+                <a:spcPct val="110000"/>
+              </a:lnSpc>
+            </a:pPr>
+            <a:r>
+              <a:rPr lang="pt-BR" dirty="0" smtClean="0"/>
+              <a:t>Utilização de </a:t>
+            </a:r>
+            <a:r>
+              <a:rPr lang="pt-BR" i="1" dirty="0" err="1" smtClean="0"/>
+              <a:t>logs</a:t>
+            </a:r>
+            <a:r>
+              <a:rPr lang="pt-BR" dirty="0" smtClean="0"/>
+              <a:t> como recursos de auditorias;</a:t>
+            </a:r>
+          </a:p>
+          <a:p>
+            <a:pPr>
+              <a:lnSpc>
+                <a:spcPct val="110000"/>
+              </a:lnSpc>
+            </a:pPr>
+            <a:r>
+              <a:rPr lang="pt-BR" dirty="0" smtClean="0"/>
+              <a:t>Localização dos eventos de forma manual;e</a:t>
+            </a:r>
+          </a:p>
+          <a:p>
+            <a:pPr>
+              <a:lnSpc>
+                <a:spcPct val="110000"/>
+              </a:lnSpc>
+            </a:pPr>
+            <a:r>
+              <a:rPr lang="pt-BR" dirty="0" smtClean="0"/>
+              <a:t>Carência de ferramentas do gênero que funcionem através da </a:t>
+            </a:r>
+            <a:r>
+              <a:rPr lang="pt-BR" i="1" dirty="0" smtClean="0"/>
+              <a:t>web.</a:t>
+            </a:r>
+            <a:r>
+              <a:rPr lang="pt-BR" dirty="0" smtClean="0"/>
+              <a:t> </a:t>
+            </a:r>
+          </a:p>
+          <a:p>
+            <a:pPr>
+              <a:buNone/>
+            </a:pPr>
+            <a:endParaRPr lang="pt-BR" dirty="0" smtClean="0"/>
+          </a:p>
+          <a:p>
+            <a:endParaRPr lang="pt-BR" dirty="0" smtClean="0"/>
           </a:p>
         </p:txBody>
       </p:sp>
@@ -5368,6 +5259,13 @@
   <p:clrMapOvr>
     <a:masterClrMapping/>
   </p:clrMapOvr>
+  <p:timing>
+    <p:tnLst>
+      <p:par>
+        <p:cTn id="1" dur="indefinite" restart="never" nodeType="tmRoot"/>
+      </p:par>
+    </p:tnLst>
+  </p:timing>
 </p:sld>
 </file>
 
@@ -5436,8 +5334,17 @@
           <a:p>
             <a:r>
               <a:rPr lang="pt-BR" dirty="0" smtClean="0"/>
-              <a:t>Portabilidade;e</a:t>
-            </a:r>
+              <a:t>Facilidad</a:t>
+            </a:r>
+            <a:r>
+              <a:rPr lang="pt-BR" dirty="0" smtClean="0"/>
+              <a:t>e de acesso</a:t>
+            </a:r>
+            <a:r>
+              <a:rPr lang="pt-BR" dirty="0" smtClean="0"/>
+              <a:t>;e</a:t>
+            </a:r>
+            <a:endParaRPr lang="pt-BR" dirty="0" smtClean="0"/>
           </a:p>
           <a:p>
             <a:endParaRPr lang="pt-BR" dirty="0" smtClean="0"/>
@@ -5455,152 +5362,17 @@
   <p:clrMapOvr>
     <a:masterClrMapping/>
   </p:clrMapOvr>
+  <p:timing>
+    <p:tnLst>
+      <p:par>
+        <p:cTn id="1" dur="indefinite" restart="never" nodeType="tmRoot"/>
+      </p:par>
+    </p:tnLst>
+  </p:timing>
 </p:sld>
 </file>
 
 <file path=ppt/slides/slide6.xml><?xml version="1.0" encoding="utf-8"?>
-<p:sld xmlns:a="http://schemas.openxmlformats.org/drawingml/2006/main" xmlns:r="http://schemas.openxmlformats.org/officeDocument/2006/relationships" xmlns:p="http://schemas.openxmlformats.org/presentationml/2006/main">
-  <p:cSld>
-    <p:spTree>
-      <p:nvGrpSpPr>
-        <p:cNvPr id="1" name=""/>
-        <p:cNvGrpSpPr/>
-        <p:nvPr/>
-      </p:nvGrpSpPr>
-      <p:grpSpPr>
-        <a:xfrm>
-          <a:off x="0" y="0"/>
-          <a:ext cx="0" cy="0"/>
-          <a:chOff x="0" y="0"/>
-          <a:chExt cx="0" cy="0"/>
-        </a:xfrm>
-      </p:grpSpPr>
-      <p:sp>
-        <p:nvSpPr>
-          <p:cNvPr id="7170" name="Título 1"/>
-          <p:cNvSpPr>
-            <a:spLocks noGrp="1"/>
-          </p:cNvSpPr>
-          <p:nvPr>
-            <p:ph type="title"/>
-          </p:nvPr>
-        </p:nvSpPr>
-        <p:spPr/>
-        <p:txBody>
-          <a:bodyPr/>
-          <a:lstStyle/>
-          <a:p>
-            <a:r>
-              <a:rPr lang="pt-BR" smtClean="0"/>
-              <a:t>Cenário Atual</a:t>
-            </a:r>
-          </a:p>
-        </p:txBody>
-      </p:sp>
-      <p:sp>
-        <p:nvSpPr>
-          <p:cNvPr id="7171" name="Espaço Reservado para Conteúdo 2"/>
-          <p:cNvSpPr>
-            <a:spLocks noGrp="1"/>
-          </p:cNvSpPr>
-          <p:nvPr>
-            <p:ph idx="1"/>
-          </p:nvPr>
-        </p:nvSpPr>
-        <p:spPr/>
-        <p:txBody>
-          <a:bodyPr>
-            <a:normAutofit/>
-          </a:bodyPr>
-          <a:lstStyle/>
-          <a:p>
-            <a:pPr>
-              <a:lnSpc>
-                <a:spcPct val="110000"/>
-              </a:lnSpc>
-            </a:pPr>
-            <a:r>
-              <a:rPr lang="pt-BR" dirty="0" smtClean="0"/>
-              <a:t>Utilização de </a:t>
-            </a:r>
-            <a:r>
-              <a:rPr lang="pt-BR" i="1" dirty="0" err="1" smtClean="0"/>
-              <a:t>logs</a:t>
-            </a:r>
-            <a:r>
-              <a:rPr lang="pt-BR" dirty="0" smtClean="0"/>
-              <a:t> para o monitoramento de sistemas;</a:t>
-            </a:r>
-          </a:p>
-          <a:p>
-            <a:pPr>
-              <a:lnSpc>
-                <a:spcPct val="110000"/>
-              </a:lnSpc>
-            </a:pPr>
-            <a:r>
-              <a:rPr lang="pt-BR" dirty="0" smtClean="0"/>
-              <a:t>Utilização de </a:t>
-            </a:r>
-            <a:r>
-              <a:rPr lang="pt-BR" i="1" dirty="0" err="1" smtClean="0"/>
-              <a:t>logs</a:t>
-            </a:r>
-            <a:r>
-              <a:rPr lang="pt-BR" dirty="0" smtClean="0"/>
-              <a:t> como recursos de auditorias;</a:t>
-            </a:r>
-          </a:p>
-          <a:p>
-            <a:pPr>
-              <a:lnSpc>
-                <a:spcPct val="110000"/>
-              </a:lnSpc>
-            </a:pPr>
-            <a:r>
-              <a:rPr lang="pt-BR" dirty="0" smtClean="0"/>
-              <a:t>Localização dos eventos de forma manual;e</a:t>
-            </a:r>
-          </a:p>
-          <a:p>
-            <a:pPr>
-              <a:lnSpc>
-                <a:spcPct val="110000"/>
-              </a:lnSpc>
-            </a:pPr>
-            <a:r>
-              <a:rPr lang="pt-BR" dirty="0" smtClean="0"/>
-              <a:t>Carência de ferramentas do gênero que funcionem através da </a:t>
-            </a:r>
-            <a:r>
-              <a:rPr lang="pt-BR" i="1" dirty="0" smtClean="0"/>
-              <a:t>web.</a:t>
-            </a:r>
-            <a:r>
-              <a:rPr lang="pt-BR" dirty="0" smtClean="0"/>
-              <a:t> </a:t>
-            </a:r>
-          </a:p>
-          <a:p>
-            <a:pPr>
-              <a:buNone/>
-            </a:pPr>
-            <a:endParaRPr lang="pt-BR" dirty="0" smtClean="0"/>
-          </a:p>
-          <a:p>
-            <a:endParaRPr lang="pt-BR" dirty="0" smtClean="0"/>
-          </a:p>
-        </p:txBody>
-      </p:sp>
-    </p:spTree>
-  </p:cSld>
-  <p:clrMapOvr>
-    <a:masterClrMapping/>
-  </p:clrMapOvr>
-</p:sld>
-</file>
-
-<file path=ppt/slides/slide7.xml><?xml version="1.0" encoding="utf-8"?>
 <p:sld xmlns:a="http://schemas.openxmlformats.org/drawingml/2006/main" xmlns:r="http://schemas.openxmlformats.org/officeDocument/2006/relationships" xmlns:p="http://schemas.openxmlformats.org/presentationml/2006/main">
   <p:cSld>
     <p:spTree>
@@ -6120,10 +5892,17 @@
   <p:clrMapOvr>
     <a:masterClrMapping/>
   </p:clrMapOvr>
+  <p:timing>
+    <p:tnLst>
+      <p:par>
+        <p:cTn id="1" dur="indefinite" restart="never" nodeType="tmRoot"/>
+      </p:par>
+    </p:tnLst>
+  </p:timing>
 </p:sld>
 </file>
 
-<file path=ppt/slides/slide8.xml><?xml version="1.0" encoding="utf-8"?>
+<file path=ppt/slides/slide7.xml><?xml version="1.0" encoding="utf-8"?>
 <p:sld xmlns:a="http://schemas.openxmlformats.org/drawingml/2006/main" xmlns:r="http://schemas.openxmlformats.org/officeDocument/2006/relationships" xmlns:p="http://schemas.openxmlformats.org/presentationml/2006/main">
   <p:cSld>
     <p:spTree>
@@ -6801,6 +6580,129 @@
   <p:clrMapOvr>
     <a:masterClrMapping/>
   </p:clrMapOvr>
+  <p:timing>
+    <p:tnLst>
+      <p:par>
+        <p:cTn id="1" dur="indefinite" restart="never" nodeType="tmRoot"/>
+      </p:par>
+    </p:tnLst>
+  </p:timing>
+</p:sld>
+</file>
+
+<file path=ppt/slides/slide8.xml><?xml version="1.0" encoding="utf-8"?>
+<p:sld xmlns:a="http://schemas.openxmlformats.org/drawingml/2006/main" xmlns:r="http://schemas.openxmlformats.org/officeDocument/2006/relationships" xmlns:p="http://schemas.openxmlformats.org/presentationml/2006/main">
+  <p:cSld>
+    <p:spTree>
+      <p:nvGrpSpPr>
+        <p:cNvPr id="1" name=""/>
+        <p:cNvGrpSpPr/>
+        <p:nvPr/>
+      </p:nvGrpSpPr>
+      <p:grpSpPr>
+        <a:xfrm>
+          <a:off x="0" y="0"/>
+          <a:ext cx="0" cy="0"/>
+          <a:chOff x="0" y="0"/>
+          <a:chExt cx="0" cy="0"/>
+        </a:xfrm>
+      </p:grpSpPr>
+      <p:sp>
+        <p:nvSpPr>
+          <p:cNvPr id="10242" name="Título 1"/>
+          <p:cNvSpPr>
+            <a:spLocks noGrp="1"/>
+          </p:cNvSpPr>
+          <p:nvPr>
+            <p:ph type="title"/>
+          </p:nvPr>
+        </p:nvSpPr>
+        <p:spPr/>
+        <p:txBody>
+          <a:bodyPr/>
+          <a:lstStyle/>
+          <a:p>
+            <a:r>
+              <a:rPr lang="pt-BR" smtClean="0"/>
+              <a:t>Limitações</a:t>
+            </a:r>
+          </a:p>
+        </p:txBody>
+      </p:sp>
+      <p:sp>
+        <p:nvSpPr>
+          <p:cNvPr id="10243" name="Espaço Reservado para Conteúdo 2"/>
+          <p:cNvSpPr>
+            <a:spLocks noGrp="1"/>
+          </p:cNvSpPr>
+          <p:nvPr>
+            <p:ph idx="1"/>
+          </p:nvPr>
+        </p:nvSpPr>
+        <p:spPr/>
+        <p:txBody>
+          <a:bodyPr/>
+          <a:lstStyle/>
+          <a:p>
+            <a:r>
+              <a:rPr lang="pt-BR" dirty="0" smtClean="0"/>
+              <a:t>A ferramenta </a:t>
+            </a:r>
+            <a:r>
+              <a:rPr lang="pt-BR" b="1" dirty="0" smtClean="0"/>
+              <a:t>não</a:t>
+            </a:r>
+            <a:r>
+              <a:rPr lang="pt-BR" dirty="0" smtClean="0"/>
+              <a:t> suporta todos os campos do Log4j;</a:t>
+            </a:r>
+          </a:p>
+          <a:p>
+            <a:endParaRPr lang="pt-BR" dirty="0" smtClean="0"/>
+          </a:p>
+          <a:p>
+            <a:r>
+              <a:rPr lang="pt-BR" dirty="0" smtClean="0"/>
+              <a:t>É necessária a utilização de delimitadores para formar uma máscara; e</a:t>
+            </a:r>
+          </a:p>
+          <a:p>
+            <a:endParaRPr lang="pt-BR" dirty="0" smtClean="0"/>
+          </a:p>
+          <a:p>
+            <a:r>
+              <a:rPr lang="pt-BR" dirty="0" smtClean="0"/>
+              <a:t>A duplicidade de campos </a:t>
+            </a:r>
+            <a:r>
+              <a:rPr lang="pt-BR" b="1" dirty="0" smtClean="0"/>
+              <a:t>não</a:t>
+            </a:r>
+            <a:r>
+              <a:rPr lang="pt-BR" dirty="0" smtClean="0"/>
+              <a:t> serão tratados na interface.</a:t>
+            </a:r>
+          </a:p>
+          <a:p>
+            <a:endParaRPr lang="pt-BR" dirty="0" smtClean="0"/>
+          </a:p>
+          <a:p>
+            <a:endParaRPr lang="pt-BR" dirty="0" smtClean="0"/>
+          </a:p>
+        </p:txBody>
+      </p:sp>
+    </p:spTree>
+  </p:cSld>
+  <p:clrMapOvr>
+    <a:masterClrMapping/>
+  </p:clrMapOvr>
+  <p:timing>
+    <p:tnLst>
+      <p:par>
+        <p:cTn id="1" dur="indefinite" restart="never" nodeType="tmRoot"/>
+      </p:par>
+    </p:tnLst>
+  </p:timing>
 </p:sld>
 </file>
 
@@ -6823,7 +6725,7 @@
       </p:grpSpPr>
       <p:sp>
         <p:nvSpPr>
-          <p:cNvPr id="10242" name="Título 1"/>
+          <p:cNvPr id="13314" name="Título 1"/>
           <p:cNvSpPr>
             <a:spLocks noGrp="1"/>
           </p:cNvSpPr>
@@ -6838,14 +6740,14 @@
           <a:p>
             <a:r>
               <a:rPr lang="pt-BR" smtClean="0"/>
-              <a:t>Limitações</a:t>
-            </a:r>
-          </a:p>
-        </p:txBody>
-      </p:sp>
-      <p:sp>
-        <p:nvSpPr>
-          <p:cNvPr id="10243" name="Espaço Reservado para Conteúdo 2"/>
+              <a:t>Protótipo</a:t>
+            </a:r>
+          </a:p>
+        </p:txBody>
+      </p:sp>
+      <p:sp>
+        <p:nvSpPr>
+          <p:cNvPr id="13315" name="Espaço Reservado para Conteúdo 2"/>
           <p:cNvSpPr>
             <a:spLocks noGrp="1"/>
           </p:cNvSpPr>
@@ -6858,50 +6760,29 @@
           <a:bodyPr/>
           <a:lstStyle/>
           <a:p>
+            <a:endParaRPr lang="pt-BR" dirty="0" smtClean="0"/>
+          </a:p>
+          <a:p>
+            <a:endParaRPr lang="pt-BR" dirty="0" smtClean="0"/>
+          </a:p>
+          <a:p>
+            <a:endParaRPr lang="pt-BR" dirty="0" smtClean="0"/>
+          </a:p>
+          <a:p>
             <a:r>
               <a:rPr lang="pt-BR" dirty="0" smtClean="0"/>
-              <a:t>A ferramenta </a:t>
-            </a:r>
-            <a:r>
-              <a:rPr lang="pt-BR" b="1" dirty="0" smtClean="0"/>
-              <a:t>não</a:t>
+              <a:t>http://</a:t>
+            </a:r>
+            <a:r>
+              <a:rPr lang="pt-BR" dirty="0" smtClean="0">
+                <a:hlinkClick r:id="rId2"/>
+              </a:rPr>
+              <a:t>localhost:8080/logview</a:t>
             </a:r>
             <a:r>
               <a:rPr lang="pt-BR" dirty="0" smtClean="0"/>
-              <a:t> suporta todos os campos do Log4j;</a:t>
-            </a:r>
-          </a:p>
-          <a:p>
-            <a:endParaRPr lang="pt-BR" dirty="0" smtClean="0"/>
-          </a:p>
-          <a:p>
-            <a:r>
-              <a:rPr lang="pt-BR" dirty="0" smtClean="0"/>
-              <a:t>É necessária a utilização de delimitadores para formar uma máscara; e</a:t>
-            </a:r>
-          </a:p>
-          <a:p>
-            <a:endParaRPr lang="pt-BR" dirty="0" smtClean="0"/>
-          </a:p>
-          <a:p>
-            <a:r>
-              <a:rPr lang="pt-BR" dirty="0" smtClean="0"/>
-              <a:t>A duplicidade de campos </a:t>
-            </a:r>
-            <a:r>
-              <a:rPr lang="pt-BR" b="1" dirty="0" smtClean="0"/>
-              <a:t>não</a:t>
-            </a:r>
-            <a:r>
-              <a:rPr lang="pt-BR" dirty="0" smtClean="0"/>
-              <a:t> serão tratados na interface.</a:t>
-            </a:r>
-            <a:endParaRPr lang="pt-BR" dirty="0" smtClean="0"/>
-          </a:p>
-          <a:p>
-            <a:endParaRPr lang="pt-BR" dirty="0" smtClean="0"/>
-          </a:p>
-          <a:p>
+              <a:t>/</a:t>
+            </a:r>
             <a:endParaRPr lang="pt-BR" dirty="0" smtClean="0"/>
           </a:p>
         </p:txBody>
@@ -6911,6 +6792,13 @@
   <p:clrMapOvr>
     <a:masterClrMapping/>
   </p:clrMapOvr>
+  <p:timing>
+    <p:tnLst>
+      <p:par>
+        <p:cTn id="1" dur="indefinite" restart="never" nodeType="tmRoot"/>
+      </p:par>
+    </p:tnLst>
+  </p:timing>
 </p:sld>
 </file>
 

</xml_diff>

<commit_message>
Versão mais atual dos slides
</commit_message>
<xml_diff>
--- a/DOCUMENTAÇÃO/_SLIDE/JMBLogViewer.pptx
+++ b/DOCUMENTAÇÃO/_SLIDE/JMBLogViewer.pptx
@@ -5,22 +5,23 @@
     <p:sldMasterId id="2147483660" r:id="rId1"/>
   </p:sldMasterIdLst>
   <p:notesMasterIdLst>
-    <p:notesMasterId r:id="rId15"/>
+    <p:notesMasterId r:id="rId16"/>
   </p:notesMasterIdLst>
   <p:sldIdLst>
     <p:sldId id="256" r:id="rId2"/>
     <p:sldId id="257" r:id="rId3"/>
     <p:sldId id="267" r:id="rId4"/>
-    <p:sldId id="269" r:id="rId5"/>
-    <p:sldId id="268" r:id="rId6"/>
-    <p:sldId id="270" r:id="rId7"/>
-    <p:sldId id="278" r:id="rId8"/>
-    <p:sldId id="271" r:id="rId9"/>
-    <p:sldId id="274" r:id="rId10"/>
-    <p:sldId id="276" r:id="rId11"/>
-    <p:sldId id="275" r:id="rId12"/>
-    <p:sldId id="280" r:id="rId13"/>
-    <p:sldId id="279" r:id="rId14"/>
+    <p:sldId id="281" r:id="rId5"/>
+    <p:sldId id="269" r:id="rId6"/>
+    <p:sldId id="268" r:id="rId7"/>
+    <p:sldId id="270" r:id="rId8"/>
+    <p:sldId id="278" r:id="rId9"/>
+    <p:sldId id="271" r:id="rId10"/>
+    <p:sldId id="274" r:id="rId11"/>
+    <p:sldId id="276" r:id="rId12"/>
+    <p:sldId id="275" r:id="rId13"/>
+    <p:sldId id="280" r:id="rId14"/>
+    <p:sldId id="279" r:id="rId15"/>
   </p:sldIdLst>
   <p:sldSz cx="9144000" cy="6858000" type="screen4x3"/>
   <p:notesSz cx="6858000" cy="9144000"/>
@@ -4365,7 +4366,7 @@
       </p:grpSpPr>
       <p:sp>
         <p:nvSpPr>
-          <p:cNvPr id="14338" name="Título 1"/>
+          <p:cNvPr id="13314" name="Título 1"/>
           <p:cNvSpPr>
             <a:spLocks noGrp="1"/>
           </p:cNvSpPr>
@@ -4379,62 +4380,50 @@
           <a:lstStyle/>
           <a:p>
             <a:r>
+              <a:rPr lang="pt-BR" smtClean="0"/>
+              <a:t>Protótipo</a:t>
+            </a:r>
+          </a:p>
+        </p:txBody>
+      </p:sp>
+      <p:sp>
+        <p:nvSpPr>
+          <p:cNvPr id="13315" name="Espaço Reservado para Conteúdo 2"/>
+          <p:cNvSpPr>
+            <a:spLocks noGrp="1"/>
+          </p:cNvSpPr>
+          <p:nvPr>
+            <p:ph idx="1"/>
+          </p:nvPr>
+        </p:nvSpPr>
+        <p:spPr/>
+        <p:txBody>
+          <a:bodyPr/>
+          <a:lstStyle/>
+          <a:p>
+            <a:endParaRPr lang="pt-BR" dirty="0" smtClean="0"/>
+          </a:p>
+          <a:p>
+            <a:endParaRPr lang="pt-BR" dirty="0" smtClean="0"/>
+          </a:p>
+          <a:p>
+            <a:endParaRPr lang="pt-BR" dirty="0" smtClean="0"/>
+          </a:p>
+          <a:p>
+            <a:r>
               <a:rPr lang="pt-BR" dirty="0" smtClean="0"/>
-              <a:t>Conclusão</a:t>
-            </a:r>
-          </a:p>
-        </p:txBody>
-      </p:sp>
-      <p:sp>
-        <p:nvSpPr>
-          <p:cNvPr id="14339" name="Espaço Reservado para Conteúdo 2"/>
-          <p:cNvSpPr>
-            <a:spLocks noGrp="1"/>
-          </p:cNvSpPr>
-          <p:nvPr>
-            <p:ph idx="1"/>
-          </p:nvPr>
-        </p:nvSpPr>
-        <p:spPr/>
-        <p:txBody>
-          <a:bodyPr/>
-          <a:lstStyle/>
-          <a:p>
+              <a:t>http://</a:t>
+            </a:r>
+            <a:r>
+              <a:rPr lang="pt-BR" dirty="0" smtClean="0">
+                <a:hlinkClick r:id="rId2"/>
+              </a:rPr>
+              <a:t>localhost:8080/logview</a:t>
+            </a:r>
             <a:r>
               <a:rPr lang="pt-BR" dirty="0" smtClean="0"/>
-              <a:t>Dificuldades;</a:t>
-            </a:r>
-          </a:p>
-          <a:p>
-            <a:endParaRPr lang="pt-BR" dirty="0" smtClean="0"/>
-          </a:p>
-          <a:p>
-            <a:r>
-              <a:rPr lang="pt-BR" dirty="0" smtClean="0"/>
-              <a:t>Aprendizado</a:t>
-            </a:r>
-            <a:r>
-              <a:rPr lang="pt-BR" dirty="0" smtClean="0"/>
-              <a:t>; e</a:t>
-            </a:r>
-            <a:endParaRPr lang="pt-BR" dirty="0" smtClean="0"/>
-          </a:p>
-          <a:p>
-            <a:endParaRPr lang="pt-BR" dirty="0" smtClean="0"/>
-          </a:p>
-          <a:p>
-            <a:r>
-              <a:rPr lang="pt-BR" dirty="0" smtClean="0"/>
-              <a:t>Melhorias </a:t>
-            </a:r>
-            <a:r>
-              <a:rPr lang="pt-BR" dirty="0" smtClean="0"/>
-              <a:t>Futuras;</a:t>
-            </a:r>
-            <a:endParaRPr lang="pt-BR" dirty="0" smtClean="0"/>
-          </a:p>
-          <a:p>
-            <a:endParaRPr lang="pt-BR" dirty="0" smtClean="0"/>
+              <a:t>/</a:t>
+            </a:r>
           </a:p>
         </p:txBody>
       </p:sp>
@@ -4472,7 +4461,7 @@
       </p:grpSpPr>
       <p:sp>
         <p:nvSpPr>
-          <p:cNvPr id="15362" name="Título 1"/>
+          <p:cNvPr id="14338" name="Título 1"/>
           <p:cNvSpPr>
             <a:spLocks noGrp="1"/>
           </p:cNvSpPr>
@@ -4486,15 +4475,15 @@
           <a:lstStyle/>
           <a:p>
             <a:r>
-              <a:rPr lang="pt-BR" smtClean="0"/>
-              <a:t>Agradecimentos</a:t>
-            </a:r>
-          </a:p>
-        </p:txBody>
-      </p:sp>
-      <p:sp>
-        <p:nvSpPr>
-          <p:cNvPr id="15363" name="Espaço Reservado para Conteúdo 2"/>
+              <a:rPr lang="pt-BR" dirty="0" smtClean="0"/>
+              <a:t>Conclusão</a:t>
+            </a:r>
+          </a:p>
+        </p:txBody>
+      </p:sp>
+      <p:sp>
+        <p:nvSpPr>
+          <p:cNvPr id="14339" name="Espaço Reservado para Conteúdo 2"/>
           <p:cNvSpPr>
             <a:spLocks noGrp="1"/>
           </p:cNvSpPr>
@@ -4507,7 +4496,31 @@
           <a:bodyPr/>
           <a:lstStyle/>
           <a:p>
-            <a:endParaRPr lang="pt-BR" smtClean="0"/>
+            <a:r>
+              <a:rPr lang="pt-BR" dirty="0" smtClean="0"/>
+              <a:t>Dificuldades;</a:t>
+            </a:r>
+          </a:p>
+          <a:p>
+            <a:endParaRPr lang="pt-BR" dirty="0" smtClean="0"/>
+          </a:p>
+          <a:p>
+            <a:r>
+              <a:rPr lang="pt-BR" dirty="0" smtClean="0"/>
+              <a:t>Aprendizado; e</a:t>
+            </a:r>
+          </a:p>
+          <a:p>
+            <a:endParaRPr lang="pt-BR" dirty="0" smtClean="0"/>
+          </a:p>
+          <a:p>
+            <a:r>
+              <a:rPr lang="pt-BR" dirty="0" smtClean="0"/>
+              <a:t>Melhorias Futuras;</a:t>
+            </a:r>
+          </a:p>
+          <a:p>
+            <a:endParaRPr lang="pt-BR" dirty="0" smtClean="0"/>
           </a:p>
         </p:txBody>
       </p:sp>
@@ -4545,7 +4558,7 @@
       </p:grpSpPr>
       <p:sp>
         <p:nvSpPr>
-          <p:cNvPr id="16386" name="Título 1"/>
+          <p:cNvPr id="15362" name="Título 1"/>
           <p:cNvSpPr>
             <a:spLocks noGrp="1"/>
           </p:cNvSpPr>
@@ -4560,14 +4573,14 @@
           <a:p>
             <a:r>
               <a:rPr lang="pt-BR" smtClean="0"/>
-              <a:t>Perguntas</a:t>
-            </a:r>
-          </a:p>
-        </p:txBody>
-      </p:sp>
-      <p:sp>
-        <p:nvSpPr>
-          <p:cNvPr id="16387" name="Espaço Reservado para Conteúdo 2"/>
+              <a:t>Agradecimentos</a:t>
+            </a:r>
+          </a:p>
+        </p:txBody>
+      </p:sp>
+      <p:sp>
+        <p:nvSpPr>
+          <p:cNvPr id="15363" name="Espaço Reservado para Conteúdo 2"/>
           <p:cNvSpPr>
             <a:spLocks noGrp="1"/>
           </p:cNvSpPr>
@@ -4618,6 +4631,79 @@
       </p:grpSpPr>
       <p:sp>
         <p:nvSpPr>
+          <p:cNvPr id="16386" name="Título 1"/>
+          <p:cNvSpPr>
+            <a:spLocks noGrp="1"/>
+          </p:cNvSpPr>
+          <p:nvPr>
+            <p:ph type="title"/>
+          </p:nvPr>
+        </p:nvSpPr>
+        <p:spPr/>
+        <p:txBody>
+          <a:bodyPr/>
+          <a:lstStyle/>
+          <a:p>
+            <a:r>
+              <a:rPr lang="pt-BR" smtClean="0"/>
+              <a:t>Perguntas</a:t>
+            </a:r>
+          </a:p>
+        </p:txBody>
+      </p:sp>
+      <p:sp>
+        <p:nvSpPr>
+          <p:cNvPr id="16387" name="Espaço Reservado para Conteúdo 2"/>
+          <p:cNvSpPr>
+            <a:spLocks noGrp="1"/>
+          </p:cNvSpPr>
+          <p:nvPr>
+            <p:ph idx="1"/>
+          </p:nvPr>
+        </p:nvSpPr>
+        <p:spPr/>
+        <p:txBody>
+          <a:bodyPr/>
+          <a:lstStyle/>
+          <a:p>
+            <a:endParaRPr lang="pt-BR" smtClean="0"/>
+          </a:p>
+        </p:txBody>
+      </p:sp>
+    </p:spTree>
+  </p:cSld>
+  <p:clrMapOvr>
+    <a:masterClrMapping/>
+  </p:clrMapOvr>
+  <p:timing>
+    <p:tnLst>
+      <p:par>
+        <p:cTn id="1" dur="indefinite" restart="never" nodeType="tmRoot"/>
+      </p:par>
+    </p:tnLst>
+  </p:timing>
+</p:sld>
+</file>
+
+<file path=ppt/slides/slide14.xml><?xml version="1.0" encoding="utf-8"?>
+<p:sld xmlns:a="http://schemas.openxmlformats.org/drawingml/2006/main" xmlns:r="http://schemas.openxmlformats.org/officeDocument/2006/relationships" xmlns:p="http://schemas.openxmlformats.org/presentationml/2006/main">
+  <p:cSld>
+    <p:spTree>
+      <p:nvGrpSpPr>
+        <p:cNvPr id="1" name=""/>
+        <p:cNvGrpSpPr/>
+        <p:nvPr/>
+      </p:nvGrpSpPr>
+      <p:grpSpPr>
+        <a:xfrm>
+          <a:off x="0" y="0"/>
+          <a:ext cx="0" cy="0"/>
+          <a:chOff x="0" y="0"/>
+          <a:chExt cx="0" cy="0"/>
+        </a:xfrm>
+      </p:grpSpPr>
+      <p:sp>
+        <p:nvSpPr>
           <p:cNvPr id="17410" name="Título 1"/>
           <p:cNvSpPr>
             <a:spLocks noGrp="1"/>
@@ -4753,8 +4839,10 @@
                 <a:latin typeface="Times New Roman" pitchFamily="18" charset="0"/>
                 <a:cs typeface="Times New Roman" pitchFamily="18" charset="0"/>
               </a:rPr>
-              <a:t>C</a:t>
-            </a:r>
+              <a:t>Conceitos</a:t>
+            </a:r>
+          </a:p>
+          <a:p>
             <a:r>
               <a:rPr lang="pt-BR" dirty="0" smtClean="0">
                 <a:solidFill>
@@ -4763,47 +4851,8 @@
                 <a:latin typeface="Times New Roman" pitchFamily="18" charset="0"/>
                 <a:cs typeface="Times New Roman" pitchFamily="18" charset="0"/>
               </a:rPr>
-              <a:t>onceito</a:t>
-            </a:r>
-            <a:r>
-              <a:rPr lang="pt-BR" dirty="0" smtClean="0">
-                <a:solidFill>
-                  <a:schemeClr val="tx1"/>
-                </a:solidFill>
-                <a:latin typeface="Times New Roman" pitchFamily="18" charset="0"/>
-                <a:cs typeface="Times New Roman" pitchFamily="18" charset="0"/>
-              </a:rPr>
-              <a:t>s</a:t>
-            </a:r>
-          </a:p>
-          <a:p>
-            <a:r>
-              <a:rPr lang="pt-BR" dirty="0" smtClean="0">
-                <a:solidFill>
-                  <a:schemeClr val="tx1"/>
-                </a:solidFill>
-                <a:latin typeface="Times New Roman" pitchFamily="18" charset="0"/>
-                <a:cs typeface="Times New Roman" pitchFamily="18" charset="0"/>
-              </a:rPr>
-              <a:t>Cenário atual</a:t>
-            </a:r>
-            <a:r>
-              <a:rPr lang="pt-BR" dirty="0" smtClean="0">
-                <a:solidFill>
-                  <a:schemeClr val="tx1"/>
-                </a:solidFill>
-                <a:latin typeface="Times New Roman" pitchFamily="18" charset="0"/>
-                <a:cs typeface="Times New Roman" pitchFamily="18" charset="0"/>
-              </a:rPr>
-              <a:t>;</a:t>
-            </a:r>
-            <a:endParaRPr lang="pt-BR" dirty="0" smtClean="0">
-              <a:solidFill>
-                <a:schemeClr val="tx1"/>
-              </a:solidFill>
-              <a:latin typeface="Times New Roman" pitchFamily="18" charset="0"/>
-              <a:cs typeface="Times New Roman" pitchFamily="18" charset="0"/>
-            </a:endParaRPr>
+              <a:t>Cenário atual;</a:t>
+            </a:r>
           </a:p>
           <a:p>
             <a:pPr eaLnBrk="1" hangingPunct="1"/>
@@ -4828,7 +4877,7 @@
                 <a:latin typeface="Times New Roman" pitchFamily="18" charset="0"/>
                 <a:cs typeface="Times New Roman" pitchFamily="18" charset="0"/>
               </a:rPr>
-              <a:t>Arquitetura</a:t>
+              <a:t>Arquitetura da Solução</a:t>
             </a:r>
             <a:r>
               <a:rPr lang="pt-BR" dirty="0" smtClean="0">
@@ -4837,10 +4886,19 @@
               </a:rPr>
               <a:t>;</a:t>
             </a:r>
-            <a:endParaRPr lang="pt-BR" dirty="0" smtClean="0">
-              <a:latin typeface="Times New Roman" pitchFamily="18" charset="0"/>
-              <a:cs typeface="Times New Roman" pitchFamily="18" charset="0"/>
-            </a:endParaRPr>
+          </a:p>
+          <a:p>
+            <a:pPr eaLnBrk="1" hangingPunct="1"/>
+            <a:r>
+              <a:rPr lang="pt-BR" dirty="0" smtClean="0">
+                <a:solidFill>
+                  <a:schemeClr val="tx1"/>
+                </a:solidFill>
+                <a:latin typeface="Times New Roman" pitchFamily="18" charset="0"/>
+                <a:cs typeface="Times New Roman" pitchFamily="18" charset="0"/>
+              </a:rPr>
+              <a:t>Limitações;</a:t>
+            </a:r>
           </a:p>
           <a:p>
             <a:pPr eaLnBrk="1" hangingPunct="1"/>
@@ -4861,67 +4919,6 @@
               </a:rPr>
               <a:t>;</a:t>
             </a:r>
-          </a:p>
-          <a:p>
-            <a:pPr lvl="0">
-              <a:defRPr/>
-            </a:pPr>
-            <a:r>
-              <a:rPr lang="pt-BR" dirty="0" smtClean="0">
-                <a:solidFill>
-                  <a:schemeClr val="tx1"/>
-                </a:solidFill>
-                <a:latin typeface="Times New Roman" pitchFamily="18" charset="0"/>
-                <a:cs typeface="Times New Roman" pitchFamily="18" charset="0"/>
-              </a:rPr>
-              <a:t>Conclusão</a:t>
-            </a:r>
-          </a:p>
-          <a:p>
-            <a:pPr>
-              <a:defRPr/>
-            </a:pPr>
-            <a:r>
-              <a:rPr lang="pt-BR" dirty="0" smtClean="0">
-                <a:solidFill>
-                  <a:schemeClr val="tx1"/>
-                </a:solidFill>
-                <a:latin typeface="Times New Roman" pitchFamily="18" charset="0"/>
-                <a:cs typeface="Times New Roman" pitchFamily="18" charset="0"/>
-              </a:rPr>
-              <a:t>Perguntas; e</a:t>
-            </a:r>
-          </a:p>
-          <a:p>
-            <a:pPr>
-              <a:defRPr/>
-            </a:pPr>
-            <a:r>
-              <a:rPr lang="pt-BR" dirty="0" smtClean="0">
-                <a:solidFill>
-                  <a:schemeClr val="tx1"/>
-                </a:solidFill>
-                <a:latin typeface="Times New Roman" pitchFamily="18" charset="0"/>
-                <a:cs typeface="Times New Roman" pitchFamily="18" charset="0"/>
-              </a:rPr>
-              <a:t>Agradecimentos</a:t>
-            </a:r>
-            <a:endParaRPr lang="pt-BR" dirty="0" smtClean="0">
-              <a:solidFill>
-                <a:schemeClr val="tx1"/>
-              </a:solidFill>
-              <a:latin typeface="Times New Roman" pitchFamily="18" charset="0"/>
-              <a:cs typeface="Times New Roman" pitchFamily="18" charset="0"/>
-            </a:endParaRPr>
-          </a:p>
-          <a:p>
-            <a:pPr lvl="0">
-              <a:defRPr/>
-            </a:pPr>
-            <a:endParaRPr lang="pt-BR" dirty="0" smtClean="0">
-              <a:latin typeface="Times New Roman" pitchFamily="18" charset="0"/>
-              <a:cs typeface="Times New Roman" pitchFamily="18" charset="0"/>
-            </a:endParaRPr>
           </a:p>
           <a:p>
             <a:pPr eaLnBrk="1" hangingPunct="1">
@@ -4980,6 +4977,214 @@
               </a:ln>
               <a:solidFill>
                 <a:schemeClr val="tx1"/>
+              </a:solidFill>
+              <a:effectLst/>
+              <a:uLnTx/>
+              <a:uFillTx/>
+              <a:latin typeface="Times New Roman" pitchFamily="18" charset="0"/>
+              <a:ea typeface="+mn-ea"/>
+              <a:cs typeface="Times New Roman" pitchFamily="18" charset="0"/>
+            </a:endParaRPr>
+          </a:p>
+        </p:txBody>
+      </p:sp>
+      <p:sp>
+        <p:nvSpPr>
+          <p:cNvPr id="6" name="Espaço Reservado para Conteúdo 2"/>
+          <p:cNvSpPr txBox="1">
+            <a:spLocks/>
+          </p:cNvSpPr>
+          <p:nvPr/>
+        </p:nvSpPr>
+        <p:spPr>
+          <a:xfrm>
+            <a:off x="4857752" y="1357298"/>
+            <a:ext cx="4071966" cy="5286412"/>
+          </a:xfrm>
+          <a:prstGeom prst="rect">
+            <a:avLst/>
+          </a:prstGeom>
+        </p:spPr>
+        <p:txBody>
+          <a:bodyPr vert="horz">
+            <a:normAutofit/>
+          </a:bodyPr>
+          <a:lstStyle/>
+          <a:p>
+            <a:pPr marL="342900" marR="0" lvl="0" indent="-342900" algn="l" defTabSz="914400" rtl="0" eaLnBrk="1" fontAlgn="auto" latinLnBrk="0" hangingPunct="1">
+              <a:lnSpc>
+                <a:spcPct val="100000"/>
+              </a:lnSpc>
+              <a:spcBef>
+                <a:spcPct val="20000"/>
+              </a:spcBef>
+              <a:spcAft>
+                <a:spcPts val="0"/>
+              </a:spcAft>
+              <a:buClr>
+                <a:schemeClr val="accent1"/>
+              </a:buClr>
+              <a:buSzPct val="70000"/>
+              <a:buFont typeface="Wingdings 2"/>
+              <a:buChar char=""/>
+              <a:tabLst/>
+              <a:defRPr/>
+            </a:pPr>
+            <a:r>
+              <a:rPr kumimoji="0" lang="pt-BR" sz="3200" b="0" i="0" u="none" strike="noStrike" kern="1200" cap="none" spc="0" normalizeH="0" baseline="0" noProof="0" dirty="0" smtClean="0">
+                <a:ln>
+                  <a:noFill/>
+                </a:ln>
+                <a:solidFill>
+                  <a:schemeClr val="tx1"/>
+                </a:solidFill>
+                <a:effectLst/>
+                <a:uLnTx/>
+                <a:uFillTx/>
+                <a:latin typeface="Times New Roman" pitchFamily="18" charset="0"/>
+                <a:ea typeface="+mn-ea"/>
+                <a:cs typeface="Times New Roman" pitchFamily="18" charset="0"/>
+              </a:rPr>
+              <a:t>Conclusão;</a:t>
+            </a:r>
+          </a:p>
+          <a:p>
+            <a:pPr marL="342900" marR="0" lvl="0" indent="-342900" algn="l" defTabSz="914400" rtl="0" eaLnBrk="1" fontAlgn="auto" latinLnBrk="0" hangingPunct="1">
+              <a:lnSpc>
+                <a:spcPct val="100000"/>
+              </a:lnSpc>
+              <a:spcBef>
+                <a:spcPct val="20000"/>
+              </a:spcBef>
+              <a:spcAft>
+                <a:spcPts val="0"/>
+              </a:spcAft>
+              <a:buClr>
+                <a:schemeClr val="accent1"/>
+              </a:buClr>
+              <a:buSzPct val="70000"/>
+              <a:buFont typeface="Wingdings 2"/>
+              <a:buChar char=""/>
+              <a:tabLst/>
+              <a:defRPr/>
+            </a:pPr>
+            <a:r>
+              <a:rPr kumimoji="0" lang="pt-BR" sz="3200" b="0" i="0" u="none" strike="noStrike" kern="1200" cap="none" spc="0" normalizeH="0" baseline="0" noProof="0" dirty="0" smtClean="0">
+                <a:ln>
+                  <a:noFill/>
+                </a:ln>
+                <a:solidFill>
+                  <a:schemeClr val="tx1"/>
+                </a:solidFill>
+                <a:effectLst/>
+                <a:uLnTx/>
+                <a:uFillTx/>
+                <a:latin typeface="Times New Roman" pitchFamily="18" charset="0"/>
+                <a:ea typeface="+mn-ea"/>
+                <a:cs typeface="Times New Roman" pitchFamily="18" charset="0"/>
+              </a:rPr>
+              <a:t>Perguntas; e</a:t>
+            </a:r>
+          </a:p>
+          <a:p>
+            <a:pPr marL="342900" marR="0" lvl="0" indent="-342900" algn="l" defTabSz="914400" rtl="0" eaLnBrk="1" fontAlgn="auto" latinLnBrk="0" hangingPunct="1">
+              <a:lnSpc>
+                <a:spcPct val="100000"/>
+              </a:lnSpc>
+              <a:spcBef>
+                <a:spcPct val="20000"/>
+              </a:spcBef>
+              <a:spcAft>
+                <a:spcPts val="0"/>
+              </a:spcAft>
+              <a:buClr>
+                <a:schemeClr val="accent1"/>
+              </a:buClr>
+              <a:buSzPct val="70000"/>
+              <a:buFont typeface="Wingdings 2"/>
+              <a:buChar char=""/>
+              <a:tabLst/>
+              <a:defRPr/>
+            </a:pPr>
+            <a:r>
+              <a:rPr kumimoji="0" lang="pt-BR" sz="3200" b="0" i="0" u="none" strike="noStrike" kern="1200" cap="none" spc="0" normalizeH="0" baseline="0" noProof="0" dirty="0" smtClean="0">
+                <a:ln>
+                  <a:noFill/>
+                </a:ln>
+                <a:solidFill>
+                  <a:schemeClr val="tx1"/>
+                </a:solidFill>
+                <a:effectLst/>
+                <a:uLnTx/>
+                <a:uFillTx/>
+                <a:latin typeface="Times New Roman" pitchFamily="18" charset="0"/>
+                <a:ea typeface="+mn-ea"/>
+                <a:cs typeface="Times New Roman" pitchFamily="18" charset="0"/>
+              </a:rPr>
+              <a:t>Agradecimentos.</a:t>
+            </a:r>
+          </a:p>
+          <a:p>
+            <a:pPr marL="342900" marR="0" lvl="0" indent="-342900" algn="l" defTabSz="914400" rtl="0" eaLnBrk="1" fontAlgn="auto" latinLnBrk="0" hangingPunct="1">
+              <a:lnSpc>
+                <a:spcPct val="100000"/>
+              </a:lnSpc>
+              <a:spcBef>
+                <a:spcPct val="20000"/>
+              </a:spcBef>
+              <a:spcAft>
+                <a:spcPts val="0"/>
+              </a:spcAft>
+              <a:buClr>
+                <a:schemeClr val="accent1"/>
+              </a:buClr>
+              <a:buSzPct val="70000"/>
+              <a:buFont typeface="Wingdings 2"/>
+              <a:buChar char=""/>
+              <a:tabLst/>
+              <a:defRPr/>
+            </a:pPr>
+            <a:endParaRPr kumimoji="0" lang="pt-BR" sz="3200" b="0" i="0" u="none" strike="noStrike" kern="1200" cap="none" spc="0" normalizeH="0" baseline="0" noProof="0" dirty="0" smtClean="0">
+              <a:ln>
+                <a:noFill/>
+              </a:ln>
+              <a:solidFill>
+                <a:schemeClr val="tx2"/>
+              </a:solidFill>
+              <a:effectLst/>
+              <a:uLnTx/>
+              <a:uFillTx/>
+              <a:latin typeface="Times New Roman" pitchFamily="18" charset="0"/>
+              <a:ea typeface="+mn-ea"/>
+              <a:cs typeface="Times New Roman" pitchFamily="18" charset="0"/>
+            </a:endParaRPr>
+          </a:p>
+          <a:p>
+            <a:pPr marL="342900" marR="0" lvl="0" indent="-342900" algn="l" defTabSz="914400" rtl="0" eaLnBrk="1" fontAlgn="auto" latinLnBrk="0" hangingPunct="1">
+              <a:lnSpc>
+                <a:spcPct val="100000"/>
+              </a:lnSpc>
+              <a:spcBef>
+                <a:spcPct val="20000"/>
+              </a:spcBef>
+              <a:spcAft>
+                <a:spcPts val="0"/>
+              </a:spcAft>
+              <a:buClr>
+                <a:schemeClr val="accent1"/>
+              </a:buClr>
+              <a:buSzPct val="70000"/>
+              <a:buFont typeface="Wingdings 2"/>
+              <a:buNone/>
+              <a:tabLst/>
+              <a:defRPr/>
+            </a:pPr>
+            <a:endParaRPr kumimoji="0" lang="pt-BR" sz="3200" b="0" i="0" u="none" strike="noStrike" kern="1200" cap="none" spc="0" normalizeH="0" baseline="0" noProof="0" dirty="0" smtClean="0">
+              <a:ln>
+                <a:noFill/>
+              </a:ln>
+              <a:solidFill>
+                <a:schemeClr val="tx2"/>
               </a:solidFill>
               <a:effectLst/>
               <a:uLnTx/>
@@ -5139,7 +5344,7 @@
       </p:grpSpPr>
       <p:sp>
         <p:nvSpPr>
-          <p:cNvPr id="7170" name="Título 1"/>
+          <p:cNvPr id="2" name="Título 1"/>
           <p:cNvSpPr>
             <a:spLocks noGrp="1"/>
           </p:cNvSpPr>
@@ -5154,14 +5359,15 @@
           <a:p>
             <a:r>
               <a:rPr lang="pt-BR" smtClean="0"/>
-              <a:t>Cenário Atual</a:t>
-            </a:r>
-          </a:p>
-        </p:txBody>
-      </p:sp>
-      <p:sp>
-        <p:nvSpPr>
-          <p:cNvPr id="7171" name="Espaço Reservado para Conteúdo 2"/>
+              <a:t>conceitos</a:t>
+            </a:r>
+            <a:endParaRPr lang="pt-BR" dirty="0"/>
+          </a:p>
+        </p:txBody>
+      </p:sp>
+      <p:sp>
+        <p:nvSpPr>
+          <p:cNvPr id="3" name="Espaço Reservado para Conteúdo 2"/>
           <p:cNvSpPr>
             <a:spLocks noGrp="1"/>
           </p:cNvSpPr>
@@ -5171,86 +5377,10 @@
         </p:nvSpPr>
         <p:spPr/>
         <p:txBody>
-          <a:bodyPr>
-            <a:normAutofit/>
-          </a:bodyPr>
-          <a:lstStyle/>
-          <a:p>
-            <a:pPr>
-              <a:lnSpc>
-                <a:spcPct val="110000"/>
-              </a:lnSpc>
-            </a:pPr>
-            <a:r>
-              <a:rPr lang="pt-BR" dirty="0" smtClean="0"/>
-              <a:t>Utilização de </a:t>
-            </a:r>
-            <a:r>
-              <a:rPr lang="pt-BR" i="1" dirty="0" err="1" smtClean="0"/>
-              <a:t>logs</a:t>
-            </a:r>
-            <a:r>
-              <a:rPr lang="pt-BR" dirty="0" smtClean="0"/>
-              <a:t> para o monitoramento de sistemas;</a:t>
-            </a:r>
-          </a:p>
-          <a:p>
-            <a:pPr>
-              <a:lnSpc>
-                <a:spcPct val="110000"/>
-              </a:lnSpc>
-            </a:pPr>
-            <a:r>
-              <a:rPr lang="pt-BR" dirty="0" smtClean="0"/>
-              <a:t>Utilização de </a:t>
-            </a:r>
-            <a:r>
-              <a:rPr lang="pt-BR" i="1" dirty="0" err="1" smtClean="0"/>
-              <a:t>logs</a:t>
-            </a:r>
-            <a:r>
-              <a:rPr lang="pt-BR" dirty="0" smtClean="0"/>
-              <a:t> como recursos de auditorias;</a:t>
-            </a:r>
-          </a:p>
-          <a:p>
-            <a:pPr>
-              <a:lnSpc>
-                <a:spcPct val="110000"/>
-              </a:lnSpc>
-            </a:pPr>
-            <a:r>
-              <a:rPr lang="pt-BR" dirty="0" smtClean="0"/>
-              <a:t>Localização dos eventos de forma manual;e</a:t>
-            </a:r>
-          </a:p>
-          <a:p>
-            <a:pPr>
-              <a:lnSpc>
-                <a:spcPct val="110000"/>
-              </a:lnSpc>
-            </a:pPr>
-            <a:r>
-              <a:rPr lang="pt-BR" dirty="0" smtClean="0"/>
-              <a:t>Carência de ferramentas do gênero que funcionem através da </a:t>
-            </a:r>
-            <a:r>
-              <a:rPr lang="pt-BR" i="1" dirty="0" smtClean="0"/>
-              <a:t>web.</a:t>
-            </a:r>
-            <a:r>
-              <a:rPr lang="pt-BR" dirty="0" smtClean="0"/>
-              <a:t> </a:t>
-            </a:r>
-          </a:p>
-          <a:p>
-            <a:pPr>
-              <a:buNone/>
-            </a:pPr>
-            <a:endParaRPr lang="pt-BR" dirty="0" smtClean="0"/>
-          </a:p>
-          <a:p>
-            <a:endParaRPr lang="pt-BR" dirty="0" smtClean="0"/>
+          <a:bodyPr/>
+          <a:lstStyle/>
+          <a:p>
+            <a:endParaRPr lang="pt-BR" dirty="0"/>
           </a:p>
         </p:txBody>
       </p:sp>
@@ -5259,13 +5389,6 @@
   <p:clrMapOvr>
     <a:masterClrMapping/>
   </p:clrMapOvr>
-  <p:timing>
-    <p:tnLst>
-      <p:par>
-        <p:cTn id="1" dur="indefinite" restart="never" nodeType="tmRoot"/>
-      </p:par>
-    </p:tnLst>
-  </p:timing>
 </p:sld>
 </file>
 
@@ -5288,7 +5411,7 @@
       </p:grpSpPr>
       <p:sp>
         <p:nvSpPr>
-          <p:cNvPr id="6146" name="Título 1"/>
+          <p:cNvPr id="7170" name="Título 1"/>
           <p:cNvSpPr>
             <a:spLocks noGrp="1"/>
           </p:cNvSpPr>
@@ -5303,14 +5426,14 @@
           <a:p>
             <a:r>
               <a:rPr lang="pt-BR" smtClean="0"/>
-              <a:t>Proposta do Trabalho</a:t>
-            </a:r>
-          </a:p>
-        </p:txBody>
-      </p:sp>
-      <p:sp>
-        <p:nvSpPr>
-          <p:cNvPr id="6147" name="Espaço Reservado para Conteúdo 2"/>
+              <a:t>Cenário Atual</a:t>
+            </a:r>
+          </a:p>
+        </p:txBody>
+      </p:sp>
+      <p:sp>
+        <p:nvSpPr>
+          <p:cNvPr id="7171" name="Espaço Reservado para Conteúdo 2"/>
           <p:cNvSpPr>
             <a:spLocks noGrp="1"/>
           </p:cNvSpPr>
@@ -5320,40 +5443,86 @@
         </p:nvSpPr>
         <p:spPr/>
         <p:txBody>
-          <a:bodyPr/>
-          <a:lstStyle/>
-          <a:p>
+          <a:bodyPr>
+            <a:normAutofit/>
+          </a:bodyPr>
+          <a:lstStyle/>
+          <a:p>
+            <a:pPr>
+              <a:lnSpc>
+                <a:spcPct val="110000"/>
+              </a:lnSpc>
+            </a:pPr>
             <a:r>
               <a:rPr lang="pt-BR" dirty="0" smtClean="0"/>
-              <a:t>Localizar eventos com agilidade;</a:t>
-            </a:r>
-          </a:p>
-          <a:p>
+              <a:t>Utilização de </a:t>
+            </a:r>
+            <a:r>
+              <a:rPr lang="pt-BR" i="1" dirty="0" err="1" smtClean="0"/>
+              <a:t>logs</a:t>
+            </a:r>
+            <a:r>
+              <a:rPr lang="pt-BR" dirty="0" smtClean="0"/>
+              <a:t> para o monitoramento de sistemas;</a:t>
+            </a:r>
+          </a:p>
+          <a:p>
+            <a:pPr>
+              <a:lnSpc>
+                <a:spcPct val="110000"/>
+              </a:lnSpc>
+            </a:pPr>
+            <a:r>
+              <a:rPr lang="pt-BR" dirty="0" smtClean="0"/>
+              <a:t>Utilização de </a:t>
+            </a:r>
+            <a:r>
+              <a:rPr lang="pt-BR" i="1" dirty="0" err="1" smtClean="0"/>
+              <a:t>logs</a:t>
+            </a:r>
+            <a:r>
+              <a:rPr lang="pt-BR" dirty="0" smtClean="0"/>
+              <a:t> como recursos de auditorias;</a:t>
+            </a:r>
+          </a:p>
+          <a:p>
+            <a:pPr>
+              <a:lnSpc>
+                <a:spcPct val="110000"/>
+              </a:lnSpc>
+            </a:pPr>
+            <a:r>
+              <a:rPr lang="pt-BR" dirty="0" smtClean="0"/>
+              <a:t>Localização dos eventos de forma manual;e</a:t>
+            </a:r>
+          </a:p>
+          <a:p>
+            <a:pPr>
+              <a:lnSpc>
+                <a:spcPct val="110000"/>
+              </a:lnSpc>
+            </a:pPr>
+            <a:r>
+              <a:rPr lang="pt-BR" dirty="0" smtClean="0"/>
+              <a:t>Carência de ferramentas do gênero que funcionem através da </a:t>
+            </a:r>
+            <a:r>
+              <a:rPr lang="pt-BR" i="1" dirty="0" smtClean="0"/>
+              <a:t>web.</a:t>
+            </a:r>
+            <a:r>
+              <a:rPr lang="pt-BR" dirty="0" smtClean="0"/>
+              <a:t> </a:t>
+            </a:r>
+          </a:p>
+          <a:p>
+            <a:pPr>
+              <a:buNone/>
+            </a:pPr>
             <a:endParaRPr lang="pt-BR" dirty="0" smtClean="0"/>
           </a:p>
           <a:p>
-            <a:r>
-              <a:rPr lang="pt-BR" dirty="0" smtClean="0"/>
-              <a:t>Facilidad</a:t>
-            </a:r>
-            <a:r>
-              <a:rPr lang="pt-BR" dirty="0" smtClean="0"/>
-              <a:t>e de acesso</a:t>
-            </a:r>
-            <a:r>
-              <a:rPr lang="pt-BR" dirty="0" smtClean="0"/>
-              <a:t>;e</a:t>
-            </a:r>
             <a:endParaRPr lang="pt-BR" dirty="0" smtClean="0"/>
-          </a:p>
-          <a:p>
-            <a:endParaRPr lang="pt-BR" dirty="0" smtClean="0"/>
-          </a:p>
-          <a:p>
-            <a:r>
-              <a:rPr lang="pt-BR" dirty="0" smtClean="0"/>
-              <a:t>Flexibilidade (configuração).</a:t>
-            </a:r>
           </a:p>
         </p:txBody>
       </p:sp>
@@ -5391,6 +5560,100 @@
       </p:grpSpPr>
       <p:sp>
         <p:nvSpPr>
+          <p:cNvPr id="6146" name="Título 1"/>
+          <p:cNvSpPr>
+            <a:spLocks noGrp="1"/>
+          </p:cNvSpPr>
+          <p:nvPr>
+            <p:ph type="title"/>
+          </p:nvPr>
+        </p:nvSpPr>
+        <p:spPr/>
+        <p:txBody>
+          <a:bodyPr/>
+          <a:lstStyle/>
+          <a:p>
+            <a:r>
+              <a:rPr lang="pt-BR" smtClean="0"/>
+              <a:t>Proposta do Trabalho</a:t>
+            </a:r>
+          </a:p>
+        </p:txBody>
+      </p:sp>
+      <p:sp>
+        <p:nvSpPr>
+          <p:cNvPr id="6147" name="Espaço Reservado para Conteúdo 2"/>
+          <p:cNvSpPr>
+            <a:spLocks noGrp="1"/>
+          </p:cNvSpPr>
+          <p:nvPr>
+            <p:ph idx="1"/>
+          </p:nvPr>
+        </p:nvSpPr>
+        <p:spPr/>
+        <p:txBody>
+          <a:bodyPr/>
+          <a:lstStyle/>
+          <a:p>
+            <a:r>
+              <a:rPr lang="pt-BR" dirty="0" smtClean="0"/>
+              <a:t>Localizar eventos com agilidade;</a:t>
+            </a:r>
+          </a:p>
+          <a:p>
+            <a:endParaRPr lang="pt-BR" dirty="0" smtClean="0"/>
+          </a:p>
+          <a:p>
+            <a:r>
+              <a:rPr lang="pt-BR" dirty="0" smtClean="0"/>
+              <a:t>Facilidade de acesso;e</a:t>
+            </a:r>
+          </a:p>
+          <a:p>
+            <a:endParaRPr lang="pt-BR" dirty="0" smtClean="0"/>
+          </a:p>
+          <a:p>
+            <a:r>
+              <a:rPr lang="pt-BR" dirty="0" smtClean="0"/>
+              <a:t>Flexibilidade (configuração).</a:t>
+            </a:r>
+          </a:p>
+        </p:txBody>
+      </p:sp>
+    </p:spTree>
+  </p:cSld>
+  <p:clrMapOvr>
+    <a:masterClrMapping/>
+  </p:clrMapOvr>
+  <p:timing>
+    <p:tnLst>
+      <p:par>
+        <p:cTn id="1" dur="indefinite" restart="never" nodeType="tmRoot"/>
+      </p:par>
+    </p:tnLst>
+  </p:timing>
+</p:sld>
+</file>
+
+<file path=ppt/slides/slide7.xml><?xml version="1.0" encoding="utf-8"?>
+<p:sld xmlns:a="http://schemas.openxmlformats.org/drawingml/2006/main" xmlns:r="http://schemas.openxmlformats.org/officeDocument/2006/relationships" xmlns:p="http://schemas.openxmlformats.org/presentationml/2006/main">
+  <p:cSld>
+    <p:spTree>
+      <p:nvGrpSpPr>
+        <p:cNvPr id="1" name=""/>
+        <p:cNvGrpSpPr/>
+        <p:nvPr/>
+      </p:nvGrpSpPr>
+      <p:grpSpPr>
+        <a:xfrm>
+          <a:off x="0" y="0"/>
+          <a:ext cx="0" cy="0"/>
+          <a:chOff x="0" y="0"/>
+          <a:chExt cx="0" cy="0"/>
+        </a:xfrm>
+      </p:grpSpPr>
+      <p:sp>
+        <p:nvSpPr>
           <p:cNvPr id="8194" name="Título 1"/>
           <p:cNvSpPr>
             <a:spLocks noGrp="1"/>
@@ -5902,7 +6165,7 @@
 </p:sld>
 </file>
 
-<file path=ppt/slides/slide7.xml><?xml version="1.0" encoding="utf-8"?>
+<file path=ppt/slides/slide8.xml><?xml version="1.0" encoding="utf-8"?>
 <p:sld xmlns:a="http://schemas.openxmlformats.org/drawingml/2006/main" xmlns:r="http://schemas.openxmlformats.org/officeDocument/2006/relationships" xmlns:p="http://schemas.openxmlformats.org/presentationml/2006/main">
   <p:cSld>
     <p:spTree>
@@ -6590,122 +6853,6 @@
 </p:sld>
 </file>
 
-<file path=ppt/slides/slide8.xml><?xml version="1.0" encoding="utf-8"?>
-<p:sld xmlns:a="http://schemas.openxmlformats.org/drawingml/2006/main" xmlns:r="http://schemas.openxmlformats.org/officeDocument/2006/relationships" xmlns:p="http://schemas.openxmlformats.org/presentationml/2006/main">
-  <p:cSld>
-    <p:spTree>
-      <p:nvGrpSpPr>
-        <p:cNvPr id="1" name=""/>
-        <p:cNvGrpSpPr/>
-        <p:nvPr/>
-      </p:nvGrpSpPr>
-      <p:grpSpPr>
-        <a:xfrm>
-          <a:off x="0" y="0"/>
-          <a:ext cx="0" cy="0"/>
-          <a:chOff x="0" y="0"/>
-          <a:chExt cx="0" cy="0"/>
-        </a:xfrm>
-      </p:grpSpPr>
-      <p:sp>
-        <p:nvSpPr>
-          <p:cNvPr id="10242" name="Título 1"/>
-          <p:cNvSpPr>
-            <a:spLocks noGrp="1"/>
-          </p:cNvSpPr>
-          <p:nvPr>
-            <p:ph type="title"/>
-          </p:nvPr>
-        </p:nvSpPr>
-        <p:spPr/>
-        <p:txBody>
-          <a:bodyPr/>
-          <a:lstStyle/>
-          <a:p>
-            <a:r>
-              <a:rPr lang="pt-BR" smtClean="0"/>
-              <a:t>Limitações</a:t>
-            </a:r>
-          </a:p>
-        </p:txBody>
-      </p:sp>
-      <p:sp>
-        <p:nvSpPr>
-          <p:cNvPr id="10243" name="Espaço Reservado para Conteúdo 2"/>
-          <p:cNvSpPr>
-            <a:spLocks noGrp="1"/>
-          </p:cNvSpPr>
-          <p:nvPr>
-            <p:ph idx="1"/>
-          </p:nvPr>
-        </p:nvSpPr>
-        <p:spPr/>
-        <p:txBody>
-          <a:bodyPr/>
-          <a:lstStyle/>
-          <a:p>
-            <a:r>
-              <a:rPr lang="pt-BR" dirty="0" smtClean="0"/>
-              <a:t>A ferramenta </a:t>
-            </a:r>
-            <a:r>
-              <a:rPr lang="pt-BR" b="1" dirty="0" smtClean="0"/>
-              <a:t>não</a:t>
-            </a:r>
-            <a:r>
-              <a:rPr lang="pt-BR" dirty="0" smtClean="0"/>
-              <a:t> suporta todos os campos do Log4j;</a:t>
-            </a:r>
-          </a:p>
-          <a:p>
-            <a:endParaRPr lang="pt-BR" dirty="0" smtClean="0"/>
-          </a:p>
-          <a:p>
-            <a:r>
-              <a:rPr lang="pt-BR" dirty="0" smtClean="0"/>
-              <a:t>É necessária a utilização de delimitadores para formar uma máscara; e</a:t>
-            </a:r>
-          </a:p>
-          <a:p>
-            <a:endParaRPr lang="pt-BR" dirty="0" smtClean="0"/>
-          </a:p>
-          <a:p>
-            <a:r>
-              <a:rPr lang="pt-BR" dirty="0" smtClean="0"/>
-              <a:t>A duplicidade de campos </a:t>
-            </a:r>
-            <a:r>
-              <a:rPr lang="pt-BR" b="1" dirty="0" smtClean="0"/>
-              <a:t>não</a:t>
-            </a:r>
-            <a:r>
-              <a:rPr lang="pt-BR" dirty="0" smtClean="0"/>
-              <a:t> serão tratados na interface.</a:t>
-            </a:r>
-          </a:p>
-          <a:p>
-            <a:endParaRPr lang="pt-BR" dirty="0" smtClean="0"/>
-          </a:p>
-          <a:p>
-            <a:endParaRPr lang="pt-BR" dirty="0" smtClean="0"/>
-          </a:p>
-        </p:txBody>
-      </p:sp>
-    </p:spTree>
-  </p:cSld>
-  <p:clrMapOvr>
-    <a:masterClrMapping/>
-  </p:clrMapOvr>
-  <p:timing>
-    <p:tnLst>
-      <p:par>
-        <p:cTn id="1" dur="indefinite" restart="never" nodeType="tmRoot"/>
-      </p:par>
-    </p:tnLst>
-  </p:timing>
-</p:sld>
-</file>
-
 <file path=ppt/slides/slide9.xml><?xml version="1.0" encoding="utf-8"?>
 <p:sld xmlns:a="http://schemas.openxmlformats.org/drawingml/2006/main" xmlns:r="http://schemas.openxmlformats.org/officeDocument/2006/relationships" xmlns:p="http://schemas.openxmlformats.org/presentationml/2006/main">
   <p:cSld>
@@ -6725,7 +6872,7 @@
       </p:grpSpPr>
       <p:sp>
         <p:nvSpPr>
-          <p:cNvPr id="13314" name="Título 1"/>
+          <p:cNvPr id="10242" name="Título 1"/>
           <p:cNvSpPr>
             <a:spLocks noGrp="1"/>
           </p:cNvSpPr>
@@ -6740,14 +6887,14 @@
           <a:p>
             <a:r>
               <a:rPr lang="pt-BR" smtClean="0"/>
-              <a:t>Protótipo</a:t>
-            </a:r>
-          </a:p>
-        </p:txBody>
-      </p:sp>
-      <p:sp>
-        <p:nvSpPr>
-          <p:cNvPr id="13315" name="Espaço Reservado para Conteúdo 2"/>
+              <a:t>Limitações</a:t>
+            </a:r>
+          </a:p>
+        </p:txBody>
+      </p:sp>
+      <p:sp>
+        <p:nvSpPr>
+          <p:cNvPr id="10243" name="Espaço Reservado para Conteúdo 2"/>
           <p:cNvSpPr>
             <a:spLocks noGrp="1"/>
           </p:cNvSpPr>
@@ -6763,26 +6910,32 @@
             <a:endParaRPr lang="pt-BR" dirty="0" smtClean="0"/>
           </a:p>
           <a:p>
+            <a:r>
+              <a:rPr lang="pt-BR" dirty="0" smtClean="0"/>
+              <a:t>É necessária a utilização de delimitadores para formar uma máscara; e</a:t>
+            </a:r>
+          </a:p>
+          <a:p>
             <a:endParaRPr lang="pt-BR" dirty="0" smtClean="0"/>
           </a:p>
           <a:p>
+            <a:r>
+              <a:rPr lang="pt-BR" dirty="0" smtClean="0"/>
+              <a:t>A duplicidade de campos </a:t>
+            </a:r>
+            <a:r>
+              <a:rPr lang="pt-BR" b="1" dirty="0" smtClean="0"/>
+              <a:t>não</a:t>
+            </a:r>
+            <a:r>
+              <a:rPr lang="pt-BR" dirty="0" smtClean="0"/>
+              <a:t> serão tratados na interface.</a:t>
+            </a:r>
+          </a:p>
+          <a:p>
             <a:endParaRPr lang="pt-BR" dirty="0" smtClean="0"/>
           </a:p>
           <a:p>
-            <a:r>
-              <a:rPr lang="pt-BR" dirty="0" smtClean="0"/>
-              <a:t>http://</a:t>
-            </a:r>
-            <a:r>
-              <a:rPr lang="pt-BR" dirty="0" smtClean="0">
-                <a:hlinkClick r:id="rId2"/>
-              </a:rPr>
-              <a:t>localhost:8080/logview</a:t>
-            </a:r>
-            <a:r>
-              <a:rPr lang="pt-BR" dirty="0" smtClean="0"/>
-              <a:t>/</a:t>
-            </a:r>
             <a:endParaRPr lang="pt-BR" dirty="0" smtClean="0"/>
           </a:p>
         </p:txBody>

</xml_diff>